<commit_message>
Génération de la présentation PowerPoint
</commit_message>
<xml_diff>
--- a/powerpoint/introduction-programmation.pptx
+++ b/powerpoint/introduction-programmation.pptx
@@ -1,6 +1,6 @@
 
 <file path=ppt/presentation.xml><?xml version="1.0" encoding="utf-8"?>
-<p:presentation xmlns:a="http://schemas.openxmlformats.org/drawingml/2006/main" xmlns:p="http://schemas.openxmlformats.org/presentationml/2006/main" xmlns:r="http://schemas.openxmlformats.org/officeDocument/2006/relationships" saveSubsetFonts="1">
+<p:presentation xmlns:a="http://schemas.openxmlformats.org/drawingml/2006/main" xmlns:r="http://schemas.openxmlformats.org/officeDocument/2006/relationships" xmlns:p="http://schemas.openxmlformats.org/presentationml/2006/main" saveSubsetFonts="1">
   <p:sldMasterIdLst>
     <p:sldMasterId id="2147483673" r:id="rId1"/>
   </p:sldMasterIdLst>
@@ -21,7 +21,6 @@
     <p:sldId id="269" r:id="rId15"/>
     <p:sldId id="270" r:id="rId16"/>
     <p:sldId id="271" r:id="rId17"/>
-    <p:sldId id="272" r:id="rId18"/>
   </p:sldIdLst>
   <p:sldSz cx="12192000" cy="6858000"/>
   <p:notesSz cx="6858000" cy="9144000"/>
@@ -29,8 +28,8 @@
     <a:defPPr>
       <a:defRPr lang="fr-FR"/>
     </a:defPPr>
-    <a:lvl1pPr algn="l" defTabSz="914400" eaLnBrk="1" hangingPunct="1" latinLnBrk="0" marL="0" rtl="0">
-      <a:defRPr kern="1200" sz="1800">
+    <a:lvl1pPr marL="0" algn="l" defTabSz="914400" rtl="0" eaLnBrk="1" latinLnBrk="0" hangingPunct="1">
+      <a:defRPr sz="1800" kern="1200">
         <a:solidFill>
           <a:schemeClr val="tx1"/>
         </a:solidFill>
@@ -39,8 +38,8 @@
         <a:cs typeface="+mn-cs"/>
       </a:defRPr>
     </a:lvl1pPr>
-    <a:lvl2pPr algn="l" defTabSz="914400" eaLnBrk="1" hangingPunct="1" latinLnBrk="0" marL="457200" rtl="0">
-      <a:defRPr kern="1200" sz="1800">
+    <a:lvl2pPr marL="457200" algn="l" defTabSz="914400" rtl="0" eaLnBrk="1" latinLnBrk="0" hangingPunct="1">
+      <a:defRPr sz="1800" kern="1200">
         <a:solidFill>
           <a:schemeClr val="tx1"/>
         </a:solidFill>
@@ -49,8 +48,8 @@
         <a:cs typeface="+mn-cs"/>
       </a:defRPr>
     </a:lvl2pPr>
-    <a:lvl3pPr algn="l" defTabSz="914400" eaLnBrk="1" hangingPunct="1" latinLnBrk="0" marL="914400" rtl="0">
-      <a:defRPr kern="1200" sz="1800">
+    <a:lvl3pPr marL="914400" algn="l" defTabSz="914400" rtl="0" eaLnBrk="1" latinLnBrk="0" hangingPunct="1">
+      <a:defRPr sz="1800" kern="1200">
         <a:solidFill>
           <a:schemeClr val="tx1"/>
         </a:solidFill>
@@ -59,8 +58,8 @@
         <a:cs typeface="+mn-cs"/>
       </a:defRPr>
     </a:lvl3pPr>
-    <a:lvl4pPr algn="l" defTabSz="914400" eaLnBrk="1" hangingPunct="1" latinLnBrk="0" marL="1371600" rtl="0">
-      <a:defRPr kern="1200" sz="1800">
+    <a:lvl4pPr marL="1371600" algn="l" defTabSz="914400" rtl="0" eaLnBrk="1" latinLnBrk="0" hangingPunct="1">
+      <a:defRPr sz="1800" kern="1200">
         <a:solidFill>
           <a:schemeClr val="tx1"/>
         </a:solidFill>
@@ -69,8 +68,8 @@
         <a:cs typeface="+mn-cs"/>
       </a:defRPr>
     </a:lvl4pPr>
-    <a:lvl5pPr algn="l" defTabSz="914400" eaLnBrk="1" hangingPunct="1" latinLnBrk="0" marL="1828800" rtl="0">
-      <a:defRPr kern="1200" sz="1800">
+    <a:lvl5pPr marL="1828800" algn="l" defTabSz="914400" rtl="0" eaLnBrk="1" latinLnBrk="0" hangingPunct="1">
+      <a:defRPr sz="1800" kern="1200">
         <a:solidFill>
           <a:schemeClr val="tx1"/>
         </a:solidFill>
@@ -79,8 +78,8 @@
         <a:cs typeface="+mn-cs"/>
       </a:defRPr>
     </a:lvl5pPr>
-    <a:lvl6pPr algn="l" defTabSz="914400" eaLnBrk="1" hangingPunct="1" latinLnBrk="0" marL="2286000" rtl="0">
-      <a:defRPr kern="1200" sz="1800">
+    <a:lvl6pPr marL="2286000" algn="l" defTabSz="914400" rtl="0" eaLnBrk="1" latinLnBrk="0" hangingPunct="1">
+      <a:defRPr sz="1800" kern="1200">
         <a:solidFill>
           <a:schemeClr val="tx1"/>
         </a:solidFill>
@@ -89,8 +88,8 @@
         <a:cs typeface="+mn-cs"/>
       </a:defRPr>
     </a:lvl6pPr>
-    <a:lvl7pPr algn="l" defTabSz="914400" eaLnBrk="1" hangingPunct="1" latinLnBrk="0" marL="2743200" rtl="0">
-      <a:defRPr kern="1200" sz="1800">
+    <a:lvl7pPr marL="2743200" algn="l" defTabSz="914400" rtl="0" eaLnBrk="1" latinLnBrk="0" hangingPunct="1">
+      <a:defRPr sz="1800" kern="1200">
         <a:solidFill>
           <a:schemeClr val="tx1"/>
         </a:solidFill>
@@ -99,8 +98,8 @@
         <a:cs typeface="+mn-cs"/>
       </a:defRPr>
     </a:lvl7pPr>
-    <a:lvl8pPr algn="l" defTabSz="914400" eaLnBrk="1" hangingPunct="1" latinLnBrk="0" marL="3200400" rtl="0">
-      <a:defRPr kern="1200" sz="1800">
+    <a:lvl8pPr marL="3200400" algn="l" defTabSz="914400" rtl="0" eaLnBrk="1" latinLnBrk="0" hangingPunct="1">
+      <a:defRPr sz="1800" kern="1200">
         <a:solidFill>
           <a:schemeClr val="tx1"/>
         </a:solidFill>
@@ -109,8 +108,8 @@
         <a:cs typeface="+mn-cs"/>
       </a:defRPr>
     </a:lvl8pPr>
-    <a:lvl9pPr algn="l" defTabSz="914400" eaLnBrk="1" hangingPunct="1" latinLnBrk="0" marL="3657600" rtl="0">
-      <a:defRPr kern="1200" sz="1800">
+    <a:lvl9pPr marL="3657600" algn="l" defTabSz="914400" rtl="0" eaLnBrk="1" latinLnBrk="0" hangingPunct="1">
+      <a:defRPr sz="1800" kern="1200">
         <a:solidFill>
           <a:schemeClr val="tx1"/>
         </a:solidFill>
@@ -282,7 +281,7 @@
           <a:p>
             <a:fld id="{BF0244F4-1A5A-4B46-BF70-664B866B9B8E}" type="datetimeFigureOut">
               <a:rPr lang="fr-CA" smtClean="0"/>
-              <a:t>2022-04-26</a:t>
+              <a:t>2022-04-29</a:t>
             </a:fld>
             <a:endParaRPr lang="fr-CA"/>
           </a:p>
@@ -334,352 +333,6 @@
     <p:extLst>
       <p:ext uri="{BB962C8B-B14F-4D97-AF65-F5344CB8AC3E}">
         <p14:creationId xmlns:p14="http://schemas.microsoft.com/office/powerpoint/2010/main" val="4106632809"/>
-      </p:ext>
-    </p:extLst>
-  </p:cSld>
-  <p:clrMapOvr>
-    <a:masterClrMapping/>
-  </p:clrMapOvr>
-</p:sldLayout>
-</file>
-
-<file path=ppt/slideLayouts/slideLayout10.xml><?xml version="1.0" encoding="utf-8"?>
-<p:sldLayout xmlns:a="http://schemas.openxmlformats.org/drawingml/2006/main" xmlns:r="http://schemas.openxmlformats.org/officeDocument/2006/relationships" xmlns:p="http://schemas.openxmlformats.org/presentationml/2006/main" type="vertTx" preserve="1">
-  <p:cSld name="Title and Vertical Text">
-    <p:spTree>
-      <p:nvGrpSpPr>
-        <p:cNvPr id="1" name=""/>
-        <p:cNvGrpSpPr/>
-        <p:nvPr/>
-      </p:nvGrpSpPr>
-      <p:grpSpPr>
-        <a:xfrm>
-          <a:off x="0" y="0"/>
-          <a:ext cx="0" cy="0"/>
-          <a:chOff x="0" y="0"/>
-          <a:chExt cx="0" cy="0"/>
-        </a:xfrm>
-      </p:grpSpPr>
-      <p:sp>
-        <p:nvSpPr>
-          <p:cNvPr id="2" name="Title 1"/>
-          <p:cNvSpPr>
-            <a:spLocks noGrp="1"/>
-          </p:cNvSpPr>
-          <p:nvPr>
-            <p:ph type="title"/>
-          </p:nvPr>
-        </p:nvSpPr>
-        <p:spPr/>
-        <p:txBody>
-          <a:bodyPr/>
-          <a:lstStyle/>
-          <a:p>
-            <a:r>
-              <a:rPr lang="en-US"/>
-              <a:t>Click to edit Master title style</a:t>
-            </a:r>
-          </a:p>
-        </p:txBody>
-      </p:sp>
-      <p:sp>
-        <p:nvSpPr>
-          <p:cNvPr id="3" name="Vertical Text Placeholder 2"/>
-          <p:cNvSpPr>
-            <a:spLocks noGrp="1"/>
-          </p:cNvSpPr>
-          <p:nvPr>
-            <p:ph type="body" orient="vert" idx="1"/>
-          </p:nvPr>
-        </p:nvSpPr>
-        <p:spPr/>
-        <p:txBody>
-          <a:bodyPr vert="eaVert"/>
-          <a:lstStyle/>
-          <a:p>
-            <a:pPr lvl="0"/>
-            <a:r>
-              <a:rPr lang="en-US"/>
-              <a:t>Click to edit Master text styles</a:t>
-            </a:r>
-          </a:p>
-          <a:p>
-            <a:pPr lvl="1"/>
-            <a:r>
-              <a:rPr lang="en-US"/>
-              <a:t>Second level</a:t>
-            </a:r>
-          </a:p>
-          <a:p>
-            <a:pPr lvl="2"/>
-            <a:r>
-              <a:rPr lang="en-US"/>
-              <a:t>Third level</a:t>
-            </a:r>
-          </a:p>
-          <a:p>
-            <a:pPr lvl="3"/>
-            <a:r>
-              <a:rPr lang="en-US"/>
-              <a:t>Fourth level</a:t>
-            </a:r>
-          </a:p>
-          <a:p>
-            <a:pPr lvl="4"/>
-            <a:r>
-              <a:rPr lang="en-US"/>
-              <a:t>Fifth level</a:t>
-            </a:r>
-          </a:p>
-        </p:txBody>
-      </p:sp>
-      <p:sp>
-        <p:nvSpPr>
-          <p:cNvPr id="4" name="Date Placeholder 3"/>
-          <p:cNvSpPr>
-            <a:spLocks noGrp="1"/>
-          </p:cNvSpPr>
-          <p:nvPr>
-            <p:ph type="dt" sz="half" idx="10"/>
-          </p:nvPr>
-        </p:nvSpPr>
-        <p:spPr/>
-        <p:txBody>
-          <a:bodyPr/>
-          <a:lstStyle/>
-          <a:p>
-            <a:fld id="{241EB5C9-1307-BA42-ABA2-0BC069CD8E7F}" type="datetimeFigureOut">
-              <a:rPr lang="en-US" smtClean="0"/>
-              <a:t>1/2/22</a:t>
-            </a:fld>
-            <a:endParaRPr lang="en-US"/>
-          </a:p>
-        </p:txBody>
-      </p:sp>
-      <p:sp>
-        <p:nvSpPr>
-          <p:cNvPr id="5" name="Footer Placeholder 4"/>
-          <p:cNvSpPr>
-            <a:spLocks noGrp="1"/>
-          </p:cNvSpPr>
-          <p:nvPr>
-            <p:ph type="ftr" sz="quarter" idx="11"/>
-          </p:nvPr>
-        </p:nvSpPr>
-        <p:spPr/>
-        <p:txBody>
-          <a:bodyPr/>
-          <a:lstStyle/>
-          <a:p>
-            <a:endParaRPr lang="en-US"/>
-          </a:p>
-        </p:txBody>
-      </p:sp>
-      <p:sp>
-        <p:nvSpPr>
-          <p:cNvPr id="6" name="Slide Number Placeholder 5"/>
-          <p:cNvSpPr>
-            <a:spLocks noGrp="1"/>
-          </p:cNvSpPr>
-          <p:nvPr>
-            <p:ph type="sldNum" sz="quarter" idx="12"/>
-          </p:nvPr>
-        </p:nvSpPr>
-        <p:spPr/>
-        <p:txBody>
-          <a:bodyPr/>
-          <a:lstStyle/>
-          <a:p>
-            <a:fld id="{C5EF2332-01BF-834F-8236-50238282D533}" type="slidenum">
-              <a:rPr lang="en-US" smtClean="0"/>
-              <a:t>‹#›</a:t>
-            </a:fld>
-            <a:endParaRPr lang="en-US"/>
-          </a:p>
-        </p:txBody>
-      </p:sp>
-    </p:spTree>
-    <p:extLst>
-      <p:ext uri="{BB962C8B-B14F-4D97-AF65-F5344CB8AC3E}">
-        <p14:creationId xmlns:p14="http://schemas.microsoft.com/office/powerpoint/2010/main" val="313914798"/>
-      </p:ext>
-    </p:extLst>
-  </p:cSld>
-  <p:clrMapOvr>
-    <a:masterClrMapping/>
-  </p:clrMapOvr>
-</p:sldLayout>
-</file>
-
-<file path=ppt/slideLayouts/slideLayout11.xml><?xml version="1.0" encoding="utf-8"?>
-<p:sldLayout xmlns:a="http://schemas.openxmlformats.org/drawingml/2006/main" xmlns:r="http://schemas.openxmlformats.org/officeDocument/2006/relationships" xmlns:p="http://schemas.openxmlformats.org/presentationml/2006/main" type="vertTitleAndTx" preserve="1">
-  <p:cSld name="Vertical Title and Text">
-    <p:spTree>
-      <p:nvGrpSpPr>
-        <p:cNvPr id="1" name=""/>
-        <p:cNvGrpSpPr/>
-        <p:nvPr/>
-      </p:nvGrpSpPr>
-      <p:grpSpPr>
-        <a:xfrm>
-          <a:off x="0" y="0"/>
-          <a:ext cx="0" cy="0"/>
-          <a:chOff x="0" y="0"/>
-          <a:chExt cx="0" cy="0"/>
-        </a:xfrm>
-      </p:grpSpPr>
-      <p:sp>
-        <p:nvSpPr>
-          <p:cNvPr id="2" name="Vertical Title 1"/>
-          <p:cNvSpPr>
-            <a:spLocks noGrp="1"/>
-          </p:cNvSpPr>
-          <p:nvPr>
-            <p:ph type="title" orient="vert"/>
-          </p:nvPr>
-        </p:nvSpPr>
-        <p:spPr>
-          <a:xfrm>
-            <a:off x="6629400" y="205979"/>
-            <a:ext cx="2057400" cy="4388644"/>
-          </a:xfrm>
-        </p:spPr>
-        <p:txBody>
-          <a:bodyPr vert="eaVert"/>
-          <a:lstStyle/>
-          <a:p>
-            <a:r>
-              <a:rPr lang="en-US"/>
-              <a:t>Click to edit Master title style</a:t>
-            </a:r>
-          </a:p>
-        </p:txBody>
-      </p:sp>
-      <p:sp>
-        <p:nvSpPr>
-          <p:cNvPr id="3" name="Vertical Text Placeholder 2"/>
-          <p:cNvSpPr>
-            <a:spLocks noGrp="1"/>
-          </p:cNvSpPr>
-          <p:nvPr>
-            <p:ph type="body" orient="vert" idx="1"/>
-          </p:nvPr>
-        </p:nvSpPr>
-        <p:spPr>
-          <a:xfrm>
-            <a:off x="457200" y="205979"/>
-            <a:ext cx="6019800" cy="4388644"/>
-          </a:xfrm>
-        </p:spPr>
-        <p:txBody>
-          <a:bodyPr vert="eaVert"/>
-          <a:lstStyle/>
-          <a:p>
-            <a:pPr lvl="0"/>
-            <a:r>
-              <a:rPr lang="en-US"/>
-              <a:t>Click to edit Master text styles</a:t>
-            </a:r>
-          </a:p>
-          <a:p>
-            <a:pPr lvl="1"/>
-            <a:r>
-              <a:rPr lang="en-US"/>
-              <a:t>Second level</a:t>
-            </a:r>
-          </a:p>
-          <a:p>
-            <a:pPr lvl="2"/>
-            <a:r>
-              <a:rPr lang="en-US"/>
-              <a:t>Third level</a:t>
-            </a:r>
-          </a:p>
-          <a:p>
-            <a:pPr lvl="3"/>
-            <a:r>
-              <a:rPr lang="en-US"/>
-              <a:t>Fourth level</a:t>
-            </a:r>
-          </a:p>
-          <a:p>
-            <a:pPr lvl="4"/>
-            <a:r>
-              <a:rPr lang="en-US"/>
-              <a:t>Fifth level</a:t>
-            </a:r>
-          </a:p>
-        </p:txBody>
-      </p:sp>
-      <p:sp>
-        <p:nvSpPr>
-          <p:cNvPr id="4" name="Date Placeholder 3"/>
-          <p:cNvSpPr>
-            <a:spLocks noGrp="1"/>
-          </p:cNvSpPr>
-          <p:nvPr>
-            <p:ph type="dt" sz="half" idx="10"/>
-          </p:nvPr>
-        </p:nvSpPr>
-        <p:spPr/>
-        <p:txBody>
-          <a:bodyPr/>
-          <a:lstStyle/>
-          <a:p>
-            <a:fld id="{241EB5C9-1307-BA42-ABA2-0BC069CD8E7F}" type="datetimeFigureOut">
-              <a:rPr lang="en-US" smtClean="0"/>
-              <a:t>1/2/22</a:t>
-            </a:fld>
-            <a:endParaRPr lang="en-US"/>
-          </a:p>
-        </p:txBody>
-      </p:sp>
-      <p:sp>
-        <p:nvSpPr>
-          <p:cNvPr id="5" name="Footer Placeholder 4"/>
-          <p:cNvSpPr>
-            <a:spLocks noGrp="1"/>
-          </p:cNvSpPr>
-          <p:nvPr>
-            <p:ph type="ftr" sz="quarter" idx="11"/>
-          </p:nvPr>
-        </p:nvSpPr>
-        <p:spPr/>
-        <p:txBody>
-          <a:bodyPr/>
-          <a:lstStyle/>
-          <a:p>
-            <a:endParaRPr lang="en-US"/>
-          </a:p>
-        </p:txBody>
-      </p:sp>
-      <p:sp>
-        <p:nvSpPr>
-          <p:cNvPr id="6" name="Slide Number Placeholder 5"/>
-          <p:cNvSpPr>
-            <a:spLocks noGrp="1"/>
-          </p:cNvSpPr>
-          <p:nvPr>
-            <p:ph type="sldNum" sz="quarter" idx="12"/>
-          </p:nvPr>
-        </p:nvSpPr>
-        <p:spPr/>
-        <p:txBody>
-          <a:bodyPr/>
-          <a:lstStyle/>
-          <a:p>
-            <a:fld id="{C5EF2332-01BF-834F-8236-50238282D533}" type="slidenum">
-              <a:rPr lang="en-US" smtClean="0"/>
-              <a:t>‹#›</a:t>
-            </a:fld>
-            <a:endParaRPr lang="en-US"/>
-          </a:p>
-        </p:txBody>
-      </p:sp>
-    </p:spTree>
-    <p:extLst>
-      <p:ext uri="{BB962C8B-B14F-4D97-AF65-F5344CB8AC3E}">
-        <p14:creationId xmlns:p14="http://schemas.microsoft.com/office/powerpoint/2010/main" val="2581529045"/>
       </p:ext>
     </p:extLst>
   </p:cSld>
@@ -843,7 +496,7 @@
           <a:p>
             <a:fld id="{BF0244F4-1A5A-4B46-BF70-664B866B9B8E}" type="datetimeFigureOut">
               <a:rPr lang="fr-CA" smtClean="0"/>
-              <a:t>2022-04-26</a:t>
+              <a:t>2022-04-29</a:t>
             </a:fld>
             <a:endParaRPr lang="fr-CA"/>
           </a:p>
@@ -1076,7 +729,7 @@
           <a:p>
             <a:fld id="{BF0244F4-1A5A-4B46-BF70-664B866B9B8E}" type="datetimeFigureOut">
               <a:rPr lang="fr-CA" smtClean="0"/>
-              <a:t>2022-04-26</a:t>
+              <a:t>2022-04-29</a:t>
             </a:fld>
             <a:endParaRPr lang="fr-CA"/>
           </a:p>
@@ -1356,7 +1009,7 @@
           <a:p>
             <a:fld id="{BF0244F4-1A5A-4B46-BF70-664B866B9B8E}" type="datetimeFigureOut">
               <a:rPr lang="fr-CA" smtClean="0"/>
-              <a:t>2022-04-26</a:t>
+              <a:t>2022-04-29</a:t>
             </a:fld>
             <a:endParaRPr lang="fr-CA"/>
           </a:p>
@@ -1498,7 +1151,7 @@
           <a:p>
             <a:fld id="{BF0244F4-1A5A-4B46-BF70-664B866B9B8E}" type="datetimeFigureOut">
               <a:rPr lang="fr-CA" smtClean="0"/>
-              <a:t>2022-04-26</a:t>
+              <a:t>2022-04-29</a:t>
             </a:fld>
             <a:endParaRPr lang="fr-CA"/>
           </a:p>
@@ -1871,7 +1524,7 @@
           <a:p>
             <a:fld id="{BF0244F4-1A5A-4B46-BF70-664B866B9B8E}" type="datetimeFigureOut">
               <a:rPr lang="fr-CA" smtClean="0"/>
-              <a:t>2022-04-26</a:t>
+              <a:t>2022-04-29</a:t>
             </a:fld>
             <a:endParaRPr lang="fr-CA"/>
           </a:p>
@@ -2013,7 +1666,7 @@
           <a:p>
             <a:fld id="{BF0244F4-1A5A-4B46-BF70-664B866B9B8E}" type="datetimeFigureOut">
               <a:rPr lang="fr-CA" smtClean="0"/>
-              <a:t>2022-04-26</a:t>
+              <a:t>2022-04-29</a:t>
             </a:fld>
             <a:endParaRPr lang="fr-CA"/>
           </a:p>
@@ -2274,535 +1927,8 @@
 </p:sldLayout>
 </file>
 
-<file path=ppt/slideLayouts/slideLayout8.xml><?xml version="1.0" encoding="utf-8"?>
-<p:sldLayout xmlns:a="http://schemas.openxmlformats.org/drawingml/2006/main" xmlns:r="http://schemas.openxmlformats.org/officeDocument/2006/relationships" xmlns:p="http://schemas.openxmlformats.org/presentationml/2006/main" type="objTx" preserve="1">
-  <p:cSld name="Content with Caption">
-    <p:spTree>
-      <p:nvGrpSpPr>
-        <p:cNvPr id="1" name=""/>
-        <p:cNvGrpSpPr/>
-        <p:nvPr/>
-      </p:nvGrpSpPr>
-      <p:grpSpPr>
-        <a:xfrm>
-          <a:off x="0" y="0"/>
-          <a:ext cx="0" cy="0"/>
-          <a:chOff x="0" y="0"/>
-          <a:chExt cx="0" cy="0"/>
-        </a:xfrm>
-      </p:grpSpPr>
-      <p:sp>
-        <p:nvSpPr>
-          <p:cNvPr id="2" name="Title 1"/>
-          <p:cNvSpPr>
-            <a:spLocks noGrp="1"/>
-          </p:cNvSpPr>
-          <p:nvPr>
-            <p:ph type="title"/>
-          </p:nvPr>
-        </p:nvSpPr>
-        <p:spPr>
-          <a:xfrm>
-            <a:off x="457201" y="204787"/>
-            <a:ext cx="3008313" cy="871538"/>
-          </a:xfrm>
-        </p:spPr>
-        <p:txBody>
-          <a:bodyPr anchor="b"/>
-          <a:lstStyle>
-            <a:lvl1pPr algn="l">
-              <a:defRPr sz="1500" b="1"/>
-            </a:lvl1pPr>
-          </a:lstStyle>
-          <a:p>
-            <a:r>
-              <a:rPr lang="en-US"/>
-              <a:t>Click to edit Master title style</a:t>
-            </a:r>
-          </a:p>
-        </p:txBody>
-      </p:sp>
-      <p:sp>
-        <p:nvSpPr>
-          <p:cNvPr id="3" name="Content Placeholder 2"/>
-          <p:cNvSpPr>
-            <a:spLocks noGrp="1"/>
-          </p:cNvSpPr>
-          <p:nvPr>
-            <p:ph idx="1"/>
-          </p:nvPr>
-        </p:nvSpPr>
-        <p:spPr>
-          <a:xfrm>
-            <a:off x="3575050" y="204788"/>
-            <a:ext cx="5111750" cy="4389835"/>
-          </a:xfrm>
-        </p:spPr>
-        <p:txBody>
-          <a:bodyPr/>
-          <a:lstStyle>
-            <a:lvl1pPr>
-              <a:defRPr sz="2400"/>
-            </a:lvl1pPr>
-            <a:lvl2pPr>
-              <a:defRPr sz="2100"/>
-            </a:lvl2pPr>
-            <a:lvl3pPr>
-              <a:defRPr sz="1800"/>
-            </a:lvl3pPr>
-            <a:lvl4pPr>
-              <a:defRPr sz="1500"/>
-            </a:lvl4pPr>
-            <a:lvl5pPr>
-              <a:defRPr sz="1500"/>
-            </a:lvl5pPr>
-            <a:lvl6pPr>
-              <a:defRPr sz="1500"/>
-            </a:lvl6pPr>
-            <a:lvl7pPr>
-              <a:defRPr sz="1500"/>
-            </a:lvl7pPr>
-            <a:lvl8pPr>
-              <a:defRPr sz="1500"/>
-            </a:lvl8pPr>
-            <a:lvl9pPr>
-              <a:defRPr sz="1500"/>
-            </a:lvl9pPr>
-          </a:lstStyle>
-          <a:p>
-            <a:pPr lvl="0"/>
-            <a:r>
-              <a:rPr lang="en-US"/>
-              <a:t>Click to edit Master text styles</a:t>
-            </a:r>
-          </a:p>
-          <a:p>
-            <a:pPr lvl="1"/>
-            <a:r>
-              <a:rPr lang="en-US"/>
-              <a:t>Second level</a:t>
-            </a:r>
-          </a:p>
-          <a:p>
-            <a:pPr lvl="2"/>
-            <a:r>
-              <a:rPr lang="en-US"/>
-              <a:t>Third level</a:t>
-            </a:r>
-          </a:p>
-          <a:p>
-            <a:pPr lvl="3"/>
-            <a:r>
-              <a:rPr lang="en-US"/>
-              <a:t>Fourth level</a:t>
-            </a:r>
-          </a:p>
-          <a:p>
-            <a:pPr lvl="4"/>
-            <a:r>
-              <a:rPr lang="en-US"/>
-              <a:t>Fifth level</a:t>
-            </a:r>
-          </a:p>
-        </p:txBody>
-      </p:sp>
-      <p:sp>
-        <p:nvSpPr>
-          <p:cNvPr id="4" name="Text Placeholder 3"/>
-          <p:cNvSpPr>
-            <a:spLocks noGrp="1"/>
-          </p:cNvSpPr>
-          <p:nvPr>
-            <p:ph type="body" sz="half" idx="2"/>
-          </p:nvPr>
-        </p:nvSpPr>
-        <p:spPr>
-          <a:xfrm>
-            <a:off x="457201" y="1076326"/>
-            <a:ext cx="3008313" cy="3518297"/>
-          </a:xfrm>
-        </p:spPr>
-        <p:txBody>
-          <a:bodyPr/>
-          <a:lstStyle>
-            <a:lvl1pPr marL="0" indent="0">
-              <a:buNone/>
-              <a:defRPr sz="1050"/>
-            </a:lvl1pPr>
-            <a:lvl2pPr marL="342900" indent="0">
-              <a:buNone/>
-              <a:defRPr sz="900"/>
-            </a:lvl2pPr>
-            <a:lvl3pPr marL="685800" indent="0">
-              <a:buNone/>
-              <a:defRPr sz="750"/>
-            </a:lvl3pPr>
-            <a:lvl4pPr marL="1028700" indent="0">
-              <a:buNone/>
-              <a:defRPr sz="675"/>
-            </a:lvl4pPr>
-            <a:lvl5pPr marL="1371600" indent="0">
-              <a:buNone/>
-              <a:defRPr sz="675"/>
-            </a:lvl5pPr>
-            <a:lvl6pPr marL="1714500" indent="0">
-              <a:buNone/>
-              <a:defRPr sz="675"/>
-            </a:lvl6pPr>
-            <a:lvl7pPr marL="2057400" indent="0">
-              <a:buNone/>
-              <a:defRPr sz="675"/>
-            </a:lvl7pPr>
-            <a:lvl8pPr marL="2400300" indent="0">
-              <a:buNone/>
-              <a:defRPr sz="675"/>
-            </a:lvl8pPr>
-            <a:lvl9pPr marL="2743200" indent="0">
-              <a:buNone/>
-              <a:defRPr sz="675"/>
-            </a:lvl9pPr>
-          </a:lstStyle>
-          <a:p>
-            <a:pPr lvl="0"/>
-            <a:r>
-              <a:rPr lang="en-US"/>
-              <a:t>Click to edit Master text styles</a:t>
-            </a:r>
-          </a:p>
-        </p:txBody>
-      </p:sp>
-      <p:sp>
-        <p:nvSpPr>
-          <p:cNvPr id="5" name="Date Placeholder 4"/>
-          <p:cNvSpPr>
-            <a:spLocks noGrp="1"/>
-          </p:cNvSpPr>
-          <p:nvPr>
-            <p:ph type="dt" sz="half" idx="10"/>
-          </p:nvPr>
-        </p:nvSpPr>
-        <p:spPr/>
-        <p:txBody>
-          <a:bodyPr/>
-          <a:lstStyle/>
-          <a:p>
-            <a:fld id="{241EB5C9-1307-BA42-ABA2-0BC069CD8E7F}" type="datetimeFigureOut">
-              <a:rPr lang="en-US" smtClean="0"/>
-              <a:t>1/2/22</a:t>
-            </a:fld>
-            <a:endParaRPr lang="en-US"/>
-          </a:p>
-        </p:txBody>
-      </p:sp>
-      <p:sp>
-        <p:nvSpPr>
-          <p:cNvPr id="6" name="Footer Placeholder 5"/>
-          <p:cNvSpPr>
-            <a:spLocks noGrp="1"/>
-          </p:cNvSpPr>
-          <p:nvPr>
-            <p:ph type="ftr" sz="quarter" idx="11"/>
-          </p:nvPr>
-        </p:nvSpPr>
-        <p:spPr/>
-        <p:txBody>
-          <a:bodyPr/>
-          <a:lstStyle/>
-          <a:p>
-            <a:endParaRPr lang="en-US"/>
-          </a:p>
-        </p:txBody>
-      </p:sp>
-      <p:sp>
-        <p:nvSpPr>
-          <p:cNvPr id="7" name="Slide Number Placeholder 6"/>
-          <p:cNvSpPr>
-            <a:spLocks noGrp="1"/>
-          </p:cNvSpPr>
-          <p:nvPr>
-            <p:ph type="sldNum" sz="quarter" idx="12"/>
-          </p:nvPr>
-        </p:nvSpPr>
-        <p:spPr/>
-        <p:txBody>
-          <a:bodyPr/>
-          <a:lstStyle/>
-          <a:p>
-            <a:fld id="{C5EF2332-01BF-834F-8236-50238282D533}" type="slidenum">
-              <a:rPr lang="en-US" smtClean="0"/>
-              <a:t>‹#›</a:t>
-            </a:fld>
-            <a:endParaRPr lang="en-US"/>
-          </a:p>
-        </p:txBody>
-      </p:sp>
-    </p:spTree>
-    <p:extLst>
-      <p:ext uri="{BB962C8B-B14F-4D97-AF65-F5344CB8AC3E}">
-        <p14:creationId xmlns:p14="http://schemas.microsoft.com/office/powerpoint/2010/main" val="3540895647"/>
-      </p:ext>
-    </p:extLst>
-  </p:cSld>
-  <p:clrMapOvr>
-    <a:masterClrMapping/>
-  </p:clrMapOvr>
-</p:sldLayout>
-</file>
-
-<file path=ppt/slideLayouts/slideLayout9.xml><?xml version="1.0" encoding="utf-8"?>
-<p:sldLayout xmlns:a="http://schemas.openxmlformats.org/drawingml/2006/main" xmlns:r="http://schemas.openxmlformats.org/officeDocument/2006/relationships" xmlns:p="http://schemas.openxmlformats.org/presentationml/2006/main" type="picTx" preserve="1">
-  <p:cSld name="Picture with Caption">
-    <p:spTree>
-      <p:nvGrpSpPr>
-        <p:cNvPr id="1" name=""/>
-        <p:cNvGrpSpPr/>
-        <p:nvPr/>
-      </p:nvGrpSpPr>
-      <p:grpSpPr>
-        <a:xfrm>
-          <a:off x="0" y="0"/>
-          <a:ext cx="0" cy="0"/>
-          <a:chOff x="0" y="0"/>
-          <a:chExt cx="0" cy="0"/>
-        </a:xfrm>
-      </p:grpSpPr>
-      <p:sp>
-        <p:nvSpPr>
-          <p:cNvPr id="2" name="Title 1"/>
-          <p:cNvSpPr>
-            <a:spLocks noGrp="1"/>
-          </p:cNvSpPr>
-          <p:nvPr>
-            <p:ph type="title"/>
-          </p:nvPr>
-        </p:nvSpPr>
-        <p:spPr>
-          <a:xfrm>
-            <a:off x="1792288" y="3600450"/>
-            <a:ext cx="5486400" cy="425054"/>
-          </a:xfrm>
-        </p:spPr>
-        <p:txBody>
-          <a:bodyPr anchor="b"/>
-          <a:lstStyle>
-            <a:lvl1pPr algn="l">
-              <a:defRPr sz="1500" b="1"/>
-            </a:lvl1pPr>
-          </a:lstStyle>
-          <a:p>
-            <a:r>
-              <a:rPr lang="en-US"/>
-              <a:t>Click to edit Master title style</a:t>
-            </a:r>
-          </a:p>
-        </p:txBody>
-      </p:sp>
-      <p:sp>
-        <p:nvSpPr>
-          <p:cNvPr id="3" name="Picture Placeholder 2"/>
-          <p:cNvSpPr>
-            <a:spLocks noGrp="1"/>
-          </p:cNvSpPr>
-          <p:nvPr>
-            <p:ph type="pic" idx="1"/>
-          </p:nvPr>
-        </p:nvSpPr>
-        <p:spPr>
-          <a:xfrm>
-            <a:off x="1792288" y="459581"/>
-            <a:ext cx="5486400" cy="3086100"/>
-          </a:xfrm>
-        </p:spPr>
-        <p:txBody>
-          <a:bodyPr/>
-          <a:lstStyle>
-            <a:lvl1pPr marL="0" indent="0">
-              <a:buNone/>
-              <a:defRPr sz="2400"/>
-            </a:lvl1pPr>
-            <a:lvl2pPr marL="342900" indent="0">
-              <a:buNone/>
-              <a:defRPr sz="2100"/>
-            </a:lvl2pPr>
-            <a:lvl3pPr marL="685800" indent="0">
-              <a:buNone/>
-              <a:defRPr sz="1800"/>
-            </a:lvl3pPr>
-            <a:lvl4pPr marL="1028700" indent="0">
-              <a:buNone/>
-              <a:defRPr sz="1500"/>
-            </a:lvl4pPr>
-            <a:lvl5pPr marL="1371600" indent="0">
-              <a:buNone/>
-              <a:defRPr sz="1500"/>
-            </a:lvl5pPr>
-            <a:lvl6pPr marL="1714500" indent="0">
-              <a:buNone/>
-              <a:defRPr sz="1500"/>
-            </a:lvl6pPr>
-            <a:lvl7pPr marL="2057400" indent="0">
-              <a:buNone/>
-              <a:defRPr sz="1500"/>
-            </a:lvl7pPr>
-            <a:lvl8pPr marL="2400300" indent="0">
-              <a:buNone/>
-              <a:defRPr sz="1500"/>
-            </a:lvl8pPr>
-            <a:lvl9pPr marL="2743200" indent="0">
-              <a:buNone/>
-              <a:defRPr sz="1500"/>
-            </a:lvl9pPr>
-          </a:lstStyle>
-          <a:p>
-            <a:endParaRPr lang="en-US"/>
-          </a:p>
-        </p:txBody>
-      </p:sp>
-      <p:sp>
-        <p:nvSpPr>
-          <p:cNvPr id="4" name="Text Placeholder 3"/>
-          <p:cNvSpPr>
-            <a:spLocks noGrp="1"/>
-          </p:cNvSpPr>
-          <p:nvPr>
-            <p:ph type="body" sz="half" idx="2"/>
-          </p:nvPr>
-        </p:nvSpPr>
-        <p:spPr>
-          <a:xfrm>
-            <a:off x="1792288" y="4025503"/>
-            <a:ext cx="5486400" cy="603647"/>
-          </a:xfrm>
-        </p:spPr>
-        <p:txBody>
-          <a:bodyPr/>
-          <a:lstStyle>
-            <a:lvl1pPr marL="0" indent="0">
-              <a:buNone/>
-              <a:defRPr sz="1050"/>
-            </a:lvl1pPr>
-            <a:lvl2pPr marL="342900" indent="0">
-              <a:buNone/>
-              <a:defRPr sz="900"/>
-            </a:lvl2pPr>
-            <a:lvl3pPr marL="685800" indent="0">
-              <a:buNone/>
-              <a:defRPr sz="750"/>
-            </a:lvl3pPr>
-            <a:lvl4pPr marL="1028700" indent="0">
-              <a:buNone/>
-              <a:defRPr sz="675"/>
-            </a:lvl4pPr>
-            <a:lvl5pPr marL="1371600" indent="0">
-              <a:buNone/>
-              <a:defRPr sz="675"/>
-            </a:lvl5pPr>
-            <a:lvl6pPr marL="1714500" indent="0">
-              <a:buNone/>
-              <a:defRPr sz="675"/>
-            </a:lvl6pPr>
-            <a:lvl7pPr marL="2057400" indent="0">
-              <a:buNone/>
-              <a:defRPr sz="675"/>
-            </a:lvl7pPr>
-            <a:lvl8pPr marL="2400300" indent="0">
-              <a:buNone/>
-              <a:defRPr sz="675"/>
-            </a:lvl8pPr>
-            <a:lvl9pPr marL="2743200" indent="0">
-              <a:buNone/>
-              <a:defRPr sz="675"/>
-            </a:lvl9pPr>
-          </a:lstStyle>
-          <a:p>
-            <a:pPr lvl="0"/>
-            <a:r>
-              <a:rPr lang="en-US"/>
-              <a:t>Click to edit Master text styles</a:t>
-            </a:r>
-          </a:p>
-        </p:txBody>
-      </p:sp>
-      <p:sp>
-        <p:nvSpPr>
-          <p:cNvPr id="5" name="Date Placeholder 4"/>
-          <p:cNvSpPr>
-            <a:spLocks noGrp="1"/>
-          </p:cNvSpPr>
-          <p:nvPr>
-            <p:ph type="dt" sz="half" idx="10"/>
-          </p:nvPr>
-        </p:nvSpPr>
-        <p:spPr/>
-        <p:txBody>
-          <a:bodyPr/>
-          <a:lstStyle/>
-          <a:p>
-            <a:fld id="{241EB5C9-1307-BA42-ABA2-0BC069CD8E7F}" type="datetimeFigureOut">
-              <a:rPr lang="en-US" smtClean="0"/>
-              <a:t>1/2/22</a:t>
-            </a:fld>
-            <a:endParaRPr lang="en-US"/>
-          </a:p>
-        </p:txBody>
-      </p:sp>
-      <p:sp>
-        <p:nvSpPr>
-          <p:cNvPr id="6" name="Footer Placeholder 5"/>
-          <p:cNvSpPr>
-            <a:spLocks noGrp="1"/>
-          </p:cNvSpPr>
-          <p:nvPr>
-            <p:ph type="ftr" sz="quarter" idx="11"/>
-          </p:nvPr>
-        </p:nvSpPr>
-        <p:spPr/>
-        <p:txBody>
-          <a:bodyPr/>
-          <a:lstStyle/>
-          <a:p>
-            <a:endParaRPr lang="en-US"/>
-          </a:p>
-        </p:txBody>
-      </p:sp>
-      <p:sp>
-        <p:nvSpPr>
-          <p:cNvPr id="7" name="Slide Number Placeholder 6"/>
-          <p:cNvSpPr>
-            <a:spLocks noGrp="1"/>
-          </p:cNvSpPr>
-          <p:nvPr>
-            <p:ph type="sldNum" sz="quarter" idx="12"/>
-          </p:nvPr>
-        </p:nvSpPr>
-        <p:spPr/>
-        <p:txBody>
-          <a:bodyPr/>
-          <a:lstStyle/>
-          <a:p>
-            <a:fld id="{C5EF2332-01BF-834F-8236-50238282D533}" type="slidenum">
-              <a:rPr lang="en-US" smtClean="0"/>
-              <a:t>‹#›</a:t>
-            </a:fld>
-            <a:endParaRPr lang="en-US"/>
-          </a:p>
-        </p:txBody>
-      </p:sp>
-    </p:spTree>
-    <p:extLst>
-      <p:ext uri="{BB962C8B-B14F-4D97-AF65-F5344CB8AC3E}">
-        <p14:creationId xmlns:p14="http://schemas.microsoft.com/office/powerpoint/2010/main" val="3566899855"/>
-      </p:ext>
-    </p:extLst>
-  </p:cSld>
-  <p:clrMapOvr>
-    <a:masterClrMapping/>
-  </p:clrMapOvr>
-</p:sldLayout>
-</file>
-
 <file path=ppt/slideMasters/slideMaster1.xml><?xml version="1.0" encoding="utf-8"?>
-<p:sldMaster xmlns:a="http://schemas.openxmlformats.org/drawingml/2006/main" xmlns:p="http://schemas.openxmlformats.org/presentationml/2006/main" xmlns:r="http://schemas.openxmlformats.org/officeDocument/2006/relationships">
+<p:sldMaster xmlns:a="http://schemas.openxmlformats.org/drawingml/2006/main" xmlns:r="http://schemas.openxmlformats.org/officeDocument/2006/relationships" xmlns:p="http://schemas.openxmlformats.org/presentationml/2006/main">
   <p:cSld>
     <p:bg>
       <p:bgRef idx="1001">
@@ -2843,7 +1969,7 @@
           </a:prstGeom>
         </p:spPr>
         <p:txBody>
-          <a:bodyPr anchor="ctr" bIns="45720" lIns="91440" rIns="91440" rtlCol="0" tIns="45720" vert="horz">
+          <a:bodyPr vert="horz" lIns="91440" tIns="45720" rIns="91440" bIns="45720" rtlCol="0" anchor="ctr">
             <a:normAutofit/>
           </a:bodyPr>
           <a:lstStyle/>
@@ -2863,7 +1989,7 @@
             <a:spLocks noGrp="1"/>
           </p:cNvSpPr>
           <p:nvPr>
-            <p:ph idx="1" type="body"/>
+            <p:ph type="body" idx="1"/>
           </p:nvPr>
         </p:nvSpPr>
         <p:spPr>
@@ -2876,7 +2002,7 @@
           </a:prstGeom>
         </p:spPr>
         <p:txBody>
-          <a:bodyPr bIns="45720" lIns="91440" rIns="91440" rtlCol="0" tIns="45720" vert="horz">
+          <a:bodyPr vert="horz" lIns="91440" tIns="45720" rIns="91440" bIns="45720" rtlCol="0">
             <a:normAutofit/>
           </a:bodyPr>
           <a:lstStyle/>
@@ -2925,7 +2051,7 @@
             <a:spLocks noGrp="1"/>
           </p:cNvSpPr>
           <p:nvPr>
-            <p:ph idx="2" sz="half" type="dt"/>
+            <p:ph type="dt" sz="half" idx="2"/>
           </p:nvPr>
         </p:nvSpPr>
         <p:spPr>
@@ -2938,7 +2064,7 @@
           </a:prstGeom>
         </p:spPr>
         <p:txBody>
-          <a:bodyPr anchor="ctr" bIns="45720" lIns="91440" rIns="91440" rtlCol="0" tIns="45720" vert="horz"/>
+          <a:bodyPr vert="horz" lIns="91440" tIns="45720" rIns="91440" bIns="45720" rtlCol="0" anchor="ctr"/>
           <a:lstStyle>
             <a:lvl1pPr algn="l">
               <a:defRPr sz="675">
@@ -2953,7 +2079,7 @@
           <a:p>
             <a:fld id="{BF0244F4-1A5A-4B46-BF70-664B866B9B8E}" type="datetimeFigureOut">
               <a:rPr lang="fr-CA" smtClean="0"/>
-              <a:t>2022-04-26</a:t>
+              <a:t>2022-04-29</a:t>
             </a:fld>
             <a:endParaRPr lang="fr-CA"/>
           </a:p>
@@ -2966,7 +2092,7 @@
             <a:spLocks noGrp="1"/>
           </p:cNvSpPr>
           <p:nvPr>
-            <p:ph idx="3" sz="quarter" type="ftr"/>
+            <p:ph type="ftr" sz="quarter" idx="3"/>
           </p:nvPr>
         </p:nvSpPr>
         <p:spPr>
@@ -2979,7 +2105,7 @@
           </a:prstGeom>
         </p:spPr>
         <p:txBody>
-          <a:bodyPr anchor="ctr" bIns="45720" lIns="91440" rIns="91440" rtlCol="0" tIns="45720" vert="horz"/>
+          <a:bodyPr vert="horz" lIns="91440" tIns="45720" rIns="91440" bIns="45720" rtlCol="0" anchor="ctr"/>
           <a:lstStyle>
             <a:lvl1pPr algn="ctr">
               <a:defRPr sz="675">
@@ -3003,7 +2129,7 @@
             <a:spLocks noGrp="1"/>
           </p:cNvSpPr>
           <p:nvPr>
-            <p:ph idx="4" sz="quarter" type="sldNum"/>
+            <p:ph type="sldNum" sz="quarter" idx="4"/>
           </p:nvPr>
         </p:nvSpPr>
         <p:spPr>
@@ -3016,7 +2142,7 @@
           </a:prstGeom>
         </p:spPr>
         <p:txBody>
-          <a:bodyPr anchor="ctr" bIns="45720" lIns="91440" rIns="91440" rtlCol="0" tIns="45720" vert="horz"/>
+          <a:bodyPr vert="horz" lIns="91440" tIns="45720" rIns="91440" bIns="45720" rtlCol="0" anchor="ctr"/>
           <a:lstStyle>
             <a:lvl1pPr algn="r">
               <a:defRPr sz="675">
@@ -3044,7 +2170,7 @@
       </p:ext>
     </p:extLst>
   </p:cSld>
-  <p:clrMap accent1="accent1" accent2="accent2" accent3="accent3" accent4="accent4" accent5="accent5" accent6="accent6" bg1="lt1" bg2="lt2" folHlink="folHlink" hlink="hlink" tx1="dk1" tx2="dk2"/>
+  <p:clrMap bg1="lt1" tx1="dk1" bg2="lt2" tx2="dk2" accent1="accent1" accent2="accent2" accent3="accent3" accent4="accent4" accent5="accent5" accent6="accent6" hlink="hlink" folHlink="folHlink"/>
   <p:sldLayoutIdLst>
     <p:sldLayoutId id="2147483674" r:id="rId1"/>
     <p:sldLayoutId id="2147483681" r:id="rId2"/>
@@ -3056,7 +2182,7 @@
   </p:sldLayoutIdLst>
   <p:txStyles>
     <p:titleStyle>
-      <a:lvl1pPr algn="l" defTabSz="514350" eaLnBrk="1" hangingPunct="1" latinLnBrk="0" rtl="0">
+      <a:lvl1pPr algn="l" defTabSz="514350" rtl="0" eaLnBrk="1" latinLnBrk="0" hangingPunct="1">
         <a:lnSpc>
           <a:spcPct val="90000"/>
         </a:lnSpc>
@@ -3064,7 +2190,7 @@
           <a:spcPct val="0"/>
         </a:spcBef>
         <a:buNone/>
-        <a:defRPr kern="1200" sz="2475">
+        <a:defRPr sz="2475" kern="1200">
           <a:solidFill>
             <a:schemeClr val="tx1"/>
           </a:solidFill>
@@ -3075,16 +2201,16 @@
       </a:lvl1pPr>
     </p:titleStyle>
     <p:bodyStyle>
-      <a:lvl1pPr algn="l" defTabSz="514350" eaLnBrk="1" hangingPunct="1" indent="-128588" latinLnBrk="0" marL="128588" rtl="0">
+      <a:lvl1pPr marL="128588" indent="-128588" algn="l" defTabSz="514350" rtl="0" eaLnBrk="1" latinLnBrk="0" hangingPunct="1">
         <a:lnSpc>
           <a:spcPct val="90000"/>
         </a:lnSpc>
         <a:spcBef>
           <a:spcPts val="563"/>
         </a:spcBef>
-        <a:buFont charset="0" panose="020B0604020202020204" pitchFamily="34" typeface="Arial"/>
+        <a:buFont typeface="Arial" panose="020B0604020202020204" pitchFamily="34" charset="0"/>
         <a:buChar char="•"/>
-        <a:defRPr kern="1200" sz="1575">
+        <a:defRPr sz="1575" kern="1200">
           <a:solidFill>
             <a:schemeClr val="tx1"/>
           </a:solidFill>
@@ -3093,16 +2219,16 @@
           <a:cs typeface="+mn-cs"/>
         </a:defRPr>
       </a:lvl1pPr>
-      <a:lvl2pPr algn="l" defTabSz="514350" eaLnBrk="1" hangingPunct="1" indent="-128588" latinLnBrk="0" marL="385763" rtl="0">
+      <a:lvl2pPr marL="385763" indent="-128588" algn="l" defTabSz="514350" rtl="0" eaLnBrk="1" latinLnBrk="0" hangingPunct="1">
         <a:lnSpc>
           <a:spcPct val="90000"/>
         </a:lnSpc>
         <a:spcBef>
           <a:spcPts val="281"/>
         </a:spcBef>
-        <a:buFont charset="0" panose="020B0604020202020204" pitchFamily="34" typeface="Arial"/>
+        <a:buFont typeface="Arial" panose="020B0604020202020204" pitchFamily="34" charset="0"/>
         <a:buChar char="•"/>
-        <a:defRPr kern="1200" sz="1350">
+        <a:defRPr sz="1350" kern="1200">
           <a:solidFill>
             <a:schemeClr val="tx1"/>
           </a:solidFill>
@@ -3111,16 +2237,16 @@
           <a:cs typeface="+mn-cs"/>
         </a:defRPr>
       </a:lvl2pPr>
-      <a:lvl3pPr algn="l" defTabSz="514350" eaLnBrk="1" hangingPunct="1" indent="-128588" latinLnBrk="0" marL="642938" rtl="0">
+      <a:lvl3pPr marL="642938" indent="-128588" algn="l" defTabSz="514350" rtl="0" eaLnBrk="1" latinLnBrk="0" hangingPunct="1">
         <a:lnSpc>
           <a:spcPct val="90000"/>
         </a:lnSpc>
         <a:spcBef>
           <a:spcPts val="281"/>
         </a:spcBef>
-        <a:buFont charset="0" panose="020B0604020202020204" pitchFamily="34" typeface="Arial"/>
+        <a:buFont typeface="Arial" panose="020B0604020202020204" pitchFamily="34" charset="0"/>
         <a:buChar char="•"/>
-        <a:defRPr kern="1200" sz="1125">
+        <a:defRPr sz="1125" kern="1200">
           <a:solidFill>
             <a:schemeClr val="tx1"/>
           </a:solidFill>
@@ -3129,16 +2255,16 @@
           <a:cs typeface="+mn-cs"/>
         </a:defRPr>
       </a:lvl3pPr>
-      <a:lvl4pPr algn="l" defTabSz="514350" eaLnBrk="1" hangingPunct="1" indent="-128588" latinLnBrk="0" marL="900113" rtl="0">
+      <a:lvl4pPr marL="900113" indent="-128588" algn="l" defTabSz="514350" rtl="0" eaLnBrk="1" latinLnBrk="0" hangingPunct="1">
         <a:lnSpc>
           <a:spcPct val="90000"/>
         </a:lnSpc>
         <a:spcBef>
           <a:spcPts val="281"/>
         </a:spcBef>
-        <a:buFont charset="0" panose="020B0604020202020204" pitchFamily="34" typeface="Arial"/>
+        <a:buFont typeface="Arial" panose="020B0604020202020204" pitchFamily="34" charset="0"/>
         <a:buChar char="•"/>
-        <a:defRPr kern="1200" sz="1013">
+        <a:defRPr sz="1013" kern="1200">
           <a:solidFill>
             <a:schemeClr val="tx1"/>
           </a:solidFill>
@@ -3147,16 +2273,16 @@
           <a:cs typeface="+mn-cs"/>
         </a:defRPr>
       </a:lvl4pPr>
-      <a:lvl5pPr algn="l" defTabSz="514350" eaLnBrk="1" hangingPunct="1" indent="-128588" latinLnBrk="0" marL="1157288" rtl="0">
+      <a:lvl5pPr marL="1157288" indent="-128588" algn="l" defTabSz="514350" rtl="0" eaLnBrk="1" latinLnBrk="0" hangingPunct="1">
         <a:lnSpc>
           <a:spcPct val="90000"/>
         </a:lnSpc>
         <a:spcBef>
           <a:spcPts val="281"/>
         </a:spcBef>
-        <a:buFont charset="0" panose="020B0604020202020204" pitchFamily="34" typeface="Arial"/>
+        <a:buFont typeface="Arial" panose="020B0604020202020204" pitchFamily="34" charset="0"/>
         <a:buChar char="•"/>
-        <a:defRPr kern="1200" sz="1013">
+        <a:defRPr sz="1013" kern="1200">
           <a:solidFill>
             <a:schemeClr val="tx1"/>
           </a:solidFill>
@@ -3165,16 +2291,16 @@
           <a:cs typeface="+mn-cs"/>
         </a:defRPr>
       </a:lvl5pPr>
-      <a:lvl6pPr algn="l" defTabSz="514350" eaLnBrk="1" hangingPunct="1" indent="-128588" latinLnBrk="0" marL="1414463" rtl="0">
+      <a:lvl6pPr marL="1414463" indent="-128588" algn="l" defTabSz="514350" rtl="0" eaLnBrk="1" latinLnBrk="0" hangingPunct="1">
         <a:lnSpc>
           <a:spcPct val="90000"/>
         </a:lnSpc>
         <a:spcBef>
           <a:spcPts val="281"/>
         </a:spcBef>
-        <a:buFont charset="0" panose="020B0604020202020204" pitchFamily="34" typeface="Arial"/>
+        <a:buFont typeface="Arial" panose="020B0604020202020204" pitchFamily="34" charset="0"/>
         <a:buChar char="•"/>
-        <a:defRPr kern="1200" sz="1013">
+        <a:defRPr sz="1013" kern="1200">
           <a:solidFill>
             <a:schemeClr val="tx1"/>
           </a:solidFill>
@@ -3183,16 +2309,16 @@
           <a:cs typeface="+mn-cs"/>
         </a:defRPr>
       </a:lvl6pPr>
-      <a:lvl7pPr algn="l" defTabSz="514350" eaLnBrk="1" hangingPunct="1" indent="-128588" latinLnBrk="0" marL="1671638" rtl="0">
+      <a:lvl7pPr marL="1671638" indent="-128588" algn="l" defTabSz="514350" rtl="0" eaLnBrk="1" latinLnBrk="0" hangingPunct="1">
         <a:lnSpc>
           <a:spcPct val="90000"/>
         </a:lnSpc>
         <a:spcBef>
           <a:spcPts val="281"/>
         </a:spcBef>
-        <a:buFont charset="0" panose="020B0604020202020204" pitchFamily="34" typeface="Arial"/>
+        <a:buFont typeface="Arial" panose="020B0604020202020204" pitchFamily="34" charset="0"/>
         <a:buChar char="•"/>
-        <a:defRPr kern="1200" sz="1013">
+        <a:defRPr sz="1013" kern="1200">
           <a:solidFill>
             <a:schemeClr val="tx1"/>
           </a:solidFill>
@@ -3201,16 +2327,16 @@
           <a:cs typeface="+mn-cs"/>
         </a:defRPr>
       </a:lvl7pPr>
-      <a:lvl8pPr algn="l" defTabSz="514350" eaLnBrk="1" hangingPunct="1" indent="-128588" latinLnBrk="0" marL="1928813" rtl="0">
+      <a:lvl8pPr marL="1928813" indent="-128588" algn="l" defTabSz="514350" rtl="0" eaLnBrk="1" latinLnBrk="0" hangingPunct="1">
         <a:lnSpc>
           <a:spcPct val="90000"/>
         </a:lnSpc>
         <a:spcBef>
           <a:spcPts val="281"/>
         </a:spcBef>
-        <a:buFont charset="0" panose="020B0604020202020204" pitchFamily="34" typeface="Arial"/>
+        <a:buFont typeface="Arial" panose="020B0604020202020204" pitchFamily="34" charset="0"/>
         <a:buChar char="•"/>
-        <a:defRPr kern="1200" sz="1013">
+        <a:defRPr sz="1013" kern="1200">
           <a:solidFill>
             <a:schemeClr val="tx1"/>
           </a:solidFill>
@@ -3219,16 +2345,16 @@
           <a:cs typeface="+mn-cs"/>
         </a:defRPr>
       </a:lvl8pPr>
-      <a:lvl9pPr algn="l" defTabSz="514350" eaLnBrk="1" hangingPunct="1" indent="-128588" latinLnBrk="0" marL="2185988" rtl="0">
+      <a:lvl9pPr marL="2185988" indent="-128588" algn="l" defTabSz="514350" rtl="0" eaLnBrk="1" latinLnBrk="0" hangingPunct="1">
         <a:lnSpc>
           <a:spcPct val="90000"/>
         </a:lnSpc>
         <a:spcBef>
           <a:spcPts val="281"/>
         </a:spcBef>
-        <a:buFont charset="0" panose="020B0604020202020204" pitchFamily="34" typeface="Arial"/>
+        <a:buFont typeface="Arial" panose="020B0604020202020204" pitchFamily="34" charset="0"/>
         <a:buChar char="•"/>
-        <a:defRPr kern="1200" sz="1013">
+        <a:defRPr sz="1013" kern="1200">
           <a:solidFill>
             <a:schemeClr val="tx1"/>
           </a:solidFill>
@@ -3242,8 +2368,8 @@
       <a:defPPr>
         <a:defRPr lang="fr-FR"/>
       </a:defPPr>
-      <a:lvl1pPr algn="l" defTabSz="514350" eaLnBrk="1" hangingPunct="1" latinLnBrk="0" marL="0" rtl="0">
-        <a:defRPr kern="1200" sz="1013">
+      <a:lvl1pPr marL="0" algn="l" defTabSz="514350" rtl="0" eaLnBrk="1" latinLnBrk="0" hangingPunct="1">
+        <a:defRPr sz="1013" kern="1200">
           <a:solidFill>
             <a:schemeClr val="tx1"/>
           </a:solidFill>
@@ -3252,8 +2378,8 @@
           <a:cs typeface="+mn-cs"/>
         </a:defRPr>
       </a:lvl1pPr>
-      <a:lvl2pPr algn="l" defTabSz="514350" eaLnBrk="1" hangingPunct="1" latinLnBrk="0" marL="257175" rtl="0">
-        <a:defRPr kern="1200" sz="1013">
+      <a:lvl2pPr marL="257175" algn="l" defTabSz="514350" rtl="0" eaLnBrk="1" latinLnBrk="0" hangingPunct="1">
+        <a:defRPr sz="1013" kern="1200">
           <a:solidFill>
             <a:schemeClr val="tx1"/>
           </a:solidFill>
@@ -3262,8 +2388,8 @@
           <a:cs typeface="+mn-cs"/>
         </a:defRPr>
       </a:lvl2pPr>
-      <a:lvl3pPr algn="l" defTabSz="514350" eaLnBrk="1" hangingPunct="1" latinLnBrk="0" marL="514350" rtl="0">
-        <a:defRPr kern="1200" sz="1013">
+      <a:lvl3pPr marL="514350" algn="l" defTabSz="514350" rtl="0" eaLnBrk="1" latinLnBrk="0" hangingPunct="1">
+        <a:defRPr sz="1013" kern="1200">
           <a:solidFill>
             <a:schemeClr val="tx1"/>
           </a:solidFill>
@@ -3272,8 +2398,8 @@
           <a:cs typeface="+mn-cs"/>
         </a:defRPr>
       </a:lvl3pPr>
-      <a:lvl4pPr algn="l" defTabSz="514350" eaLnBrk="1" hangingPunct="1" latinLnBrk="0" marL="771525" rtl="0">
-        <a:defRPr kern="1200" sz="1013">
+      <a:lvl4pPr marL="771525" algn="l" defTabSz="514350" rtl="0" eaLnBrk="1" latinLnBrk="0" hangingPunct="1">
+        <a:defRPr sz="1013" kern="1200">
           <a:solidFill>
             <a:schemeClr val="tx1"/>
           </a:solidFill>
@@ -3282,8 +2408,8 @@
           <a:cs typeface="+mn-cs"/>
         </a:defRPr>
       </a:lvl4pPr>
-      <a:lvl5pPr algn="l" defTabSz="514350" eaLnBrk="1" hangingPunct="1" latinLnBrk="0" marL="1028700" rtl="0">
-        <a:defRPr kern="1200" sz="1013">
+      <a:lvl5pPr marL="1028700" algn="l" defTabSz="514350" rtl="0" eaLnBrk="1" latinLnBrk="0" hangingPunct="1">
+        <a:defRPr sz="1013" kern="1200">
           <a:solidFill>
             <a:schemeClr val="tx1"/>
           </a:solidFill>
@@ -3292,8 +2418,8 @@
           <a:cs typeface="+mn-cs"/>
         </a:defRPr>
       </a:lvl5pPr>
-      <a:lvl6pPr algn="l" defTabSz="514350" eaLnBrk="1" hangingPunct="1" latinLnBrk="0" marL="1285875" rtl="0">
-        <a:defRPr kern="1200" sz="1013">
+      <a:lvl6pPr marL="1285875" algn="l" defTabSz="514350" rtl="0" eaLnBrk="1" latinLnBrk="0" hangingPunct="1">
+        <a:defRPr sz="1013" kern="1200">
           <a:solidFill>
             <a:schemeClr val="tx1"/>
           </a:solidFill>
@@ -3302,8 +2428,8 @@
           <a:cs typeface="+mn-cs"/>
         </a:defRPr>
       </a:lvl6pPr>
-      <a:lvl7pPr algn="l" defTabSz="514350" eaLnBrk="1" hangingPunct="1" latinLnBrk="0" marL="1543050" rtl="0">
-        <a:defRPr kern="1200" sz="1013">
+      <a:lvl7pPr marL="1543050" algn="l" defTabSz="514350" rtl="0" eaLnBrk="1" latinLnBrk="0" hangingPunct="1">
+        <a:defRPr sz="1013" kern="1200">
           <a:solidFill>
             <a:schemeClr val="tx1"/>
           </a:solidFill>
@@ -3312,8 +2438,8 @@
           <a:cs typeface="+mn-cs"/>
         </a:defRPr>
       </a:lvl7pPr>
-      <a:lvl8pPr algn="l" defTabSz="514350" eaLnBrk="1" hangingPunct="1" latinLnBrk="0" marL="1800225" rtl="0">
-        <a:defRPr kern="1200" sz="1013">
+      <a:lvl8pPr marL="1800225" algn="l" defTabSz="514350" rtl="0" eaLnBrk="1" latinLnBrk="0" hangingPunct="1">
+        <a:defRPr sz="1013" kern="1200">
           <a:solidFill>
             <a:schemeClr val="tx1"/>
           </a:solidFill>
@@ -3322,8 +2448,8 @@
           <a:cs typeface="+mn-cs"/>
         </a:defRPr>
       </a:lvl8pPr>
-      <a:lvl9pPr algn="l" defTabSz="514350" eaLnBrk="1" hangingPunct="1" latinLnBrk="0" marL="2057400" rtl="0">
-        <a:defRPr kern="1200" sz="1013">
+      <a:lvl9pPr marL="2057400" algn="l" defTabSz="514350" rtl="0" eaLnBrk="1" latinLnBrk="0" hangingPunct="1">
+        <a:defRPr sz="1013" kern="1200">
           <a:solidFill>
             <a:schemeClr val="tx1"/>
           </a:solidFill>
@@ -3374,11 +2500,10 @@
           <a:bodyPr/>
           <a:lstStyle/>
           <a:p>
-            <a:pPr lvl="0" indent="0" marL="0">
-              <a:buNone/>
-            </a:pPr>
-            <a:r>
-              <a:rPr/>
+            <a:pPr marL="0" lvl="0" indent="0">
+              <a:buNone/>
+            </a:pPr>
+            <a:r>
               <a:t>Introduction à la programmation</a:t>
             </a:r>
           </a:p>
@@ -3386,6 +2511,9 @@
       </p:sp>
     </p:spTree>
   </p:cSld>
+  <p:clrMapOvr>
+    <a:masterClrMapping/>
+  </p:clrMapOvr>
 </p:sld>
 </file>
 
@@ -3426,11 +2554,10 @@
           <a:bodyPr/>
           <a:lstStyle/>
           <a:p>
-            <a:pPr lvl="0" indent="0" marL="0">
-              <a:buNone/>
-            </a:pPr>
-            <a:r>
-              <a:rPr/>
+            <a:pPr marL="0" lvl="0" indent="0">
+              <a:buNone/>
+            </a:pPr>
+            <a:r>
               <a:t>Comme on apprend la logique de la programmation, le cours de </a:t>
             </a:r>
             <a:r>
@@ -3438,7 +2565,6 @@
               <a:t>Programmation 1</a:t>
             </a:r>
             <a:r>
-              <a:rPr/>
               <a:t> pourrait se donner dans </a:t>
             </a:r>
             <a:r>
@@ -3446,7 +2572,6 @@
               <a:t>n’importe quel langage</a:t>
             </a:r>
             <a:r>
-              <a:rPr/>
               <a:t>.​</a:t>
             </a:r>
           </a:p>
@@ -3454,6 +2579,9 @@
       </p:sp>
     </p:spTree>
   </p:cSld>
+  <p:clrMapOvr>
+    <a:masterClrMapping/>
+  </p:clrMapOvr>
 </p:sld>
 </file>
 
@@ -3494,11 +2622,10 @@
           <a:bodyPr/>
           <a:lstStyle/>
           <a:p>
-            <a:pPr lvl="0" indent="0" marL="0">
-              <a:buNone/>
-            </a:pPr>
-            <a:r>
-              <a:rPr/>
+            <a:pPr marL="0" lvl="0" indent="0">
+              <a:buNone/>
+            </a:pPr>
+            <a:r>
               <a:t>C#</a:t>
             </a:r>
           </a:p>
@@ -3519,48 +2646,42 @@
           <a:bodyPr/>
           <a:lstStyle/>
           <a:p>
-            <a:pPr lvl="0" indent="0" marL="0">
-              <a:buNone/>
-            </a:pPr>
-            <a:r>
-              <a:rPr/>
+            <a:pPr marL="0" lvl="0" indent="0">
+              <a:buNone/>
+            </a:pPr>
+            <a:r>
               <a:t>C# (prononcé C sharp) est un langage de programmation orienté objet à typage fort, créé par la société Microsoft, et notamment un de ses employés, Anders Hejlsberg, le créateur du langage Delphi.​​</a:t>
             </a:r>
           </a:p>
           <a:p>
-            <a:pPr lvl="0" indent="0" marL="0">
-              <a:buNone/>
-            </a:pPr>
-            <a:r>
-              <a:rPr/>
+            <a:pPr marL="0" lvl="0" indent="0">
+              <a:buNone/>
+            </a:pPr>
+            <a:r>
               <a:t>C# est un langage développé par Microsoft dans le but de contrer la popularité de Java et qui selon ses concepteurs est:​</a:t>
             </a:r>
           </a:p>
           <a:p>
             <a:pPr lvl="0"/>
             <a:r>
-              <a:rPr/>
               <a:t>Simple​</a:t>
             </a:r>
           </a:p>
           <a:p>
             <a:pPr lvl="0"/>
             <a:r>
-              <a:rPr/>
               <a:t>Orienté Objet ​</a:t>
             </a:r>
           </a:p>
           <a:p>
             <a:pPr lvl="0"/>
             <a:r>
-              <a:rPr/>
               <a:t>Robuste et sûr​</a:t>
             </a:r>
           </a:p>
           <a:p>
             <a:pPr lvl="0"/>
             <a:r>
-              <a:rPr/>
               <a:t>Multitâches</a:t>
             </a:r>
           </a:p>
@@ -3568,6 +2689,9 @@
       </p:sp>
     </p:spTree>
   </p:cSld>
+  <p:clrMapOvr>
+    <a:masterClrMapping/>
+  </p:clrMapOvr>
 </p:sld>
 </file>
 
@@ -3603,7 +2727,7 @@
           <a:bodyPr/>
           <a:lstStyle/>
           <a:p>
-            <a:pPr lvl="0" indent="0" marL="0">
+            <a:pPr marL="0" lvl="0" indent="0">
               <a:buNone/>
             </a:pPr>
             <a:r>
@@ -3614,51 +2738,44 @@
           <a:p>
             <a:pPr lvl="0"/>
             <a:r>
-              <a:rPr/>
               <a:t>Très populaire dans l’industrie​</a:t>
             </a:r>
           </a:p>
           <a:p>
             <a:pPr lvl="0"/>
             <a:r>
-              <a:rPr/>
               <a:t>Le plus documenté sur le WEB​</a:t>
             </a:r>
           </a:p>
           <a:p>
             <a:pPr lvl="0"/>
             <a:r>
-              <a:rPr/>
               <a:t>Syntaxe très conviviale et structurée​</a:t>
             </a:r>
           </a:p>
           <a:p>
             <a:pPr lvl="0"/>
             <a:r>
-              <a:rPr/>
               <a:t>Facile à débugger​</a:t>
             </a:r>
           </a:p>
           <a:p>
             <a:pPr lvl="0"/>
             <a:r>
-              <a:rPr/>
               <a:t>Obligation d’utiliser les objets ​</a:t>
             </a:r>
           </a:p>
           <a:p>
             <a:pPr lvl="0"/>
             <a:r>
-              <a:rPr/>
               <a:t>Gratuit (pour vous)!​</a:t>
             </a:r>
           </a:p>
           <a:p>
-            <a:pPr lvl="0" indent="0" marL="0">
-              <a:buNone/>
-            </a:pPr>
-            <a:r>
-              <a:rPr/>
+            <a:pPr marL="0" lvl="0" indent="0">
+              <a:buNone/>
+            </a:pPr>
+            <a:r>
               <a:t>Un second langage de programmation, le </a:t>
             </a:r>
             <a:r>
@@ -3666,7 +2783,6 @@
               <a:t>JavaScript</a:t>
             </a:r>
             <a:r>
-              <a:rPr/>
               <a:t>, sera introduit un peu plus tard dans la session. C’est un langage reconnu dans le domaine de la programmation Web et il est de plus en plus utilisé dans d’autres contextes.</a:t>
             </a:r>
           </a:p>
@@ -3674,6 +2790,9 @@
       </p:sp>
     </p:spTree>
   </p:cSld>
+  <p:clrMapOvr>
+    <a:masterClrMapping/>
+  </p:clrMapOvr>
 </p:sld>
 </file>
 
@@ -3714,11 +2833,10 @@
           <a:bodyPr/>
           <a:lstStyle/>
           <a:p>
-            <a:pPr lvl="0" indent="0" marL="0">
-              <a:buNone/>
-            </a:pPr>
-            <a:r>
-              <a:rPr/>
+            <a:pPr marL="0" lvl="0" indent="0">
+              <a:buNone/>
+            </a:pPr>
+            <a:r>
               <a:t>Mon premier programme​</a:t>
             </a:r>
           </a:p>
@@ -3739,25 +2857,23 @@
           <a:bodyPr/>
           <a:lstStyle/>
           <a:p>
-            <a:pPr lvl="0" indent="0" marL="0">
-              <a:buNone/>
-            </a:pPr>
-            <a:r>
-              <a:rPr/>
+            <a:pPr marL="0" lvl="0" indent="0">
+              <a:buNone/>
+            </a:pPr>
+            <a:r>
               <a:t>Nous allons débuter un nouveau programme « Bonjour le monde ». ​ « Hello world » (traduit littéralement en français par « Bonjour le monde ») sont les mots traditionnellement écrits par un programme informatique simple dont le but est de faire la démonstration rapide de son exécution sans erreur. (Wikipedia)​</a:t>
             </a:r>
           </a:p>
           <a:p>
-            <a:pPr lvl="0" indent="0" marL="0">
-              <a:buNone/>
-            </a:pPr>
-            <a:r>
-              <a:rPr/>
+            <a:pPr marL="0" lvl="0" indent="0">
+              <a:buNone/>
+            </a:pPr>
+            <a:r>
               <a:t>Votre premier programme vous permettra d’écrire vos premières lignes de code et d’exécuter le code inscrit. Ce premier programme simple permettra de valider que votre environnement est fonctionnel. ​</a:t>
             </a:r>
           </a:p>
           <a:p>
-            <a:pPr lvl="0" indent="0" marL="0">
+            <a:pPr marL="0" lvl="0" indent="0">
               <a:buNone/>
             </a:pPr>
             <a:r>
@@ -3768,28 +2884,24 @@
           <a:p>
             <a:pPr lvl="0"/>
             <a:r>
-              <a:rPr/>
               <a:t>https://docs.microsoft.com/en-us/dotnet/core/tutorials/with-visual-studio-code​</a:t>
             </a:r>
           </a:p>
           <a:p>
             <a:pPr lvl="0"/>
             <a:r>
-              <a:rPr/>
               <a:t>https://code.visualstudio.com/docs/languages/dotnet#_create-a-c-hello-world-app​</a:t>
             </a:r>
           </a:p>
           <a:p>
             <a:pPr lvl="0"/>
             <a:r>
-              <a:rPr/>
               <a:t>https://code.visualstudio.com/docs/languages/dotnet​</a:t>
             </a:r>
           </a:p>
           <a:p>
             <a:pPr lvl="0"/>
             <a:r>
-              <a:rPr/>
               <a:t>https://code.visualstudio.com/docs/languages/csharp​</a:t>
             </a:r>
           </a:p>
@@ -3797,6 +2909,9 @@
       </p:sp>
     </p:spTree>
   </p:cSld>
+  <p:clrMapOvr>
+    <a:masterClrMapping/>
+  </p:clrMapOvr>
 </p:sld>
 </file>
 
@@ -3832,7 +2947,7 @@
           <a:bodyPr/>
           <a:lstStyle/>
           <a:p>
-            <a:pPr lvl="0" indent="0" marL="0">
+            <a:pPr marL="0" lvl="0" indent="0">
               <a:spcBef>
                 <a:spcPts val="3000"/>
               </a:spcBef>
@@ -3844,71 +2959,62 @@
             </a:r>
           </a:p>
           <a:p>
-            <a:pPr lvl="0" indent="0" marL="0">
-              <a:buNone/>
-            </a:pPr>
-            <a:r>
-              <a:rPr/>
+            <a:pPr marL="0" lvl="0" indent="0">
+              <a:buNone/>
+            </a:pPr>
+            <a:r>
               <a:t>Étape 1 : Démarrer Visual Studio Code​</a:t>
             </a:r>
           </a:p>
           <a:p>
-            <a:pPr lvl="0" indent="0" marL="0">
-              <a:buNone/>
-            </a:pPr>
-            <a:r>
-              <a:rPr/>
+            <a:pPr marL="0" lvl="0" indent="0">
+              <a:buNone/>
+            </a:pPr>
+            <a:r>
               <a:t>Étape 2 : Ouvrir un dossier qui contiendra votre programme​</a:t>
             </a:r>
           </a:p>
           <a:p>
             <a:pPr lvl="0"/>
             <a:r>
-              <a:rPr/>
               <a:t>Fichier - Ouvrir le dossier…​</a:t>
             </a:r>
           </a:p>
           <a:p>
             <a:pPr lvl="0"/>
             <a:r>
-              <a:rPr/>
               <a:t>Choisir un emplacement approprié (par exemple, Documents / Programmation 1)​</a:t>
             </a:r>
           </a:p>
           <a:p>
             <a:pPr lvl="0"/>
             <a:r>
-              <a:rPr/>
               <a:t>Créer un sous-dossier nommé BonjourLeMonde​</a:t>
             </a:r>
           </a:p>
           <a:p>
             <a:pPr lvl="0"/>
             <a:r>
-              <a:rPr/>
               <a:t>Sélectionner le dossier créé​</a:t>
             </a:r>
           </a:p>
           <a:p>
-            <a:pPr lvl="0" indent="0" marL="0">
-              <a:buNone/>
-            </a:pPr>
-            <a:r>
-              <a:rPr/>
+            <a:pPr marL="0" lvl="0" indent="0">
+              <a:buNone/>
+            </a:pPr>
+            <a:r>
               <a:t>Étape 3 : Ouvrir le terminal et initialiser votre programme​</a:t>
             </a:r>
           </a:p>
           <a:p>
             <a:pPr lvl="0"/>
             <a:r>
-              <a:rPr/>
               <a:t>View -&gt; Terminal (raccourci clavier : CTRL `)​</a:t>
             </a:r>
           </a:p>
           <a:p>
             <a:pPr lvl="0"/>
             <a:r>
-              <a:rPr/>
               <a:t>Dans le terminal, écrivez la commande suivante : dotnet new console​</a:t>
             </a:r>
           </a:p>
@@ -3916,6 +3022,9 @@
       </p:sp>
     </p:spTree>
   </p:cSld>
+  <p:clrMapOvr>
+    <a:masterClrMapping/>
+  </p:clrMapOvr>
 </p:sld>
 </file>
 
@@ -3951,50 +3060,44 @@
           <a:bodyPr/>
           <a:lstStyle/>
           <a:p>
-            <a:pPr lvl="0" indent="0" marL="0">
-              <a:buNone/>
-            </a:pPr>
-            <a:r>
-              <a:rPr/>
+            <a:pPr marL="0" lvl="0" indent="0">
+              <a:buNone/>
+            </a:pPr>
+            <a:r>
               <a:t>Étape 4 : Écrire le code du programme​</a:t>
             </a:r>
           </a:p>
           <a:p>
             <a:pPr lvl="0"/>
             <a:r>
-              <a:rPr/>
               <a:t>Prenez un moment pour consulter le contenu présent dans le fichier Program.cs (on y reviendra!)​</a:t>
             </a:r>
           </a:p>
           <a:p>
             <a:pPr lvl="0"/>
             <a:r>
-              <a:rPr/>
               <a:t>Modifiez le texte « Hello World! » Pour « Bonjour le monde! »​</a:t>
             </a:r>
           </a:p>
           <a:p>
-            <a:pPr lvl="0" indent="0" marL="0">
-              <a:buNone/>
-            </a:pPr>
-            <a:r>
-              <a:rPr/>
+            <a:pPr marL="0" lvl="0" indent="0">
+              <a:buNone/>
+            </a:pPr>
+            <a:r>
               <a:t>Étape 5 : Démarrer l’exécution du programme ​</a:t>
             </a:r>
           </a:p>
           <a:p>
             <a:pPr lvl="0"/>
             <a:r>
-              <a:rPr/>
               <a:t>Menu Exécuter &gt; Démarrer le débogage (commande F5)​</a:t>
             </a:r>
           </a:p>
           <a:p>
-            <a:pPr lvl="0" indent="0" marL="0">
-              <a:buNone/>
-            </a:pPr>
-            <a:r>
-              <a:rPr/>
+            <a:pPr marL="0" lvl="0" indent="0">
+              <a:buNone/>
+            </a:pPr>
+            <a:r>
               <a:t>Étape 6 : Observez le résultat!</a:t>
             </a:r>
           </a:p>
@@ -4002,6 +3105,9 @@
       </p:sp>
     </p:spTree>
   </p:cSld>
+  <p:clrMapOvr>
+    <a:masterClrMapping/>
+  </p:clrMapOvr>
 </p:sld>
 </file>
 
@@ -4042,11 +3148,10 @@
           <a:bodyPr/>
           <a:lstStyle/>
           <a:p>
-            <a:pPr lvl="0" indent="0" marL="0">
-              <a:buNone/>
-            </a:pPr>
-            <a:r>
-              <a:rPr/>
+            <a:pPr marL="0" lvl="0" indent="0">
+              <a:buNone/>
+            </a:pPr>
+            <a:r>
               <a:t>Exercice</a:t>
             </a:r>
           </a:p>
@@ -4067,122 +3172,44 @@
           <a:bodyPr/>
           <a:lstStyle/>
           <a:p>
-            <a:pPr lvl="0" indent="0" marL="0">
-              <a:buNone/>
-            </a:pPr>
-            <a:r>
-              <a:rPr/>
+            <a:pPr marL="0" lvl="0" indent="0">
+              <a:buNone/>
+            </a:pPr>
+            <a:r>
               <a:t>(Introduction à la programmation)[exercices/introduction-programmation]</a:t>
+            </a:r>
+          </a:p>
+          <a:p>
+            <a:pPr marL="0" lvl="0" indent="0">
+              <a:buNone/>
+            </a:pPr>
+            <a:r>
+              <a:t>​</a:t>
+            </a:r>
+          </a:p>
+          <a:p>
+            <a:pPr marL="0" lvl="0" indent="0">
+              <a:buNone/>
+            </a:pPr>
+            <a:r>
+              <a:t>​ ​</a:t>
+            </a:r>
+          </a:p>
+          <a:p>
+            <a:pPr marL="0" lvl="0" indent="0">
+              <a:buNone/>
+            </a:pPr>
+            <a:r>
+              <a:t>​</a:t>
             </a:r>
           </a:p>
         </p:txBody>
       </p:sp>
     </p:spTree>
   </p:cSld>
-</p:sld>
-</file>
-
-<file path=ppt/slides/slide17.xml><?xml version="1.0" encoding="utf-8"?>
-<p:sld xmlns:a="http://schemas.openxmlformats.org/drawingml/2006/main" xmlns:r="http://schemas.openxmlformats.org/officeDocument/2006/relationships" xmlns:p="http://schemas.openxmlformats.org/presentationml/2006/main">
-  <p:cSld>
-    <p:spTree>
-      <p:nvGrpSpPr>
-        <p:cNvPr id="1" name=""/>
-        <p:cNvGrpSpPr/>
-        <p:nvPr/>
-      </p:nvGrpSpPr>
-      <p:grpSpPr>
-        <a:xfrm>
-          <a:off x="0" y="0"/>
-          <a:ext cx="0" cy="0"/>
-          <a:chOff x="0" y="0"/>
-          <a:chExt cx="0" cy="0"/>
-        </a:xfrm>
-      </p:grpSpPr>
-      <p:sp>
-        <p:nvSpPr>
-          <p:cNvPr id="2" name="Titre 1"/>
-          <p:cNvSpPr>
-            <a:spLocks noGrp="1"/>
-          </p:cNvSpPr>
-          <p:nvPr>
-            <p:ph type="title"/>
-          </p:nvPr>
-        </p:nvSpPr>
-        <p:spPr>
-          <a:xfrm>
-            <a:off x="101600" y="65432"/>
-            <a:ext cx="10515600" cy="615602"/>
-          </a:xfrm>
-        </p:spPr>
-        <p:txBody>
-          <a:bodyPr/>
-          <a:lstStyle/>
-          <a:p>
-            <a:pPr lvl="0" indent="0" marL="0">
-              <a:buNone/>
-            </a:pPr>
-            <a:r>
-              <a:rPr/>
-              <a:t>En devoir</a:t>
-            </a:r>
-          </a:p>
-        </p:txBody>
-      </p:sp>
-      <p:sp>
-        <p:nvSpPr>
-          <p:cNvPr id="3" name="Espace réservé du contenu 2"/>
-          <p:cNvSpPr>
-            <a:spLocks noGrp="1"/>
-          </p:cNvSpPr>
-          <p:nvPr>
-            <p:ph idx="1"/>
-          </p:nvPr>
-        </p:nvSpPr>
-        <p:spPr/>
-        <p:txBody>
-          <a:bodyPr/>
-          <a:lstStyle/>
-          <a:p>
-            <a:pPr lvl="0" indent="0" marL="0">
-              <a:buNone/>
-            </a:pPr>
-            <a:r>
-              <a:rPr/>
-              <a:t>Écoutez la vidéo interactive avant le prochain cours et répondez aux questions en cours d’écoute : https://edpuzzle.com/assignments/6234c3444b105842fb04d09e/watch</a:t>
-            </a:r>
-          </a:p>
-          <a:p>
-            <a:pPr lvl="0" indent="0" marL="0">
-              <a:buNone/>
-            </a:pPr>
-            <a:r>
-              <a:rPr/>
-              <a:t>​</a:t>
-            </a:r>
-          </a:p>
-          <a:p>
-            <a:pPr lvl="0" indent="0" marL="0">
-              <a:buNone/>
-            </a:pPr>
-            <a:r>
-              <a:rPr/>
-              <a:t>​ ​</a:t>
-            </a:r>
-          </a:p>
-          <a:p>
-            <a:pPr lvl="0" indent="0" marL="0">
-              <a:buNone/>
-            </a:pPr>
-            <a:r>
-              <a:rPr/>
-              <a:t>​</a:t>
-            </a:r>
-          </a:p>
-        </p:txBody>
-      </p:sp>
-    </p:spTree>
-  </p:cSld>
+  <p:clrMapOvr>
+    <a:masterClrMapping/>
+  </p:clrMapOvr>
 </p:sld>
 </file>
 
@@ -4223,11 +3250,10 @@
           <a:bodyPr/>
           <a:lstStyle/>
           <a:p>
-            <a:pPr lvl="0" indent="0" marL="0">
-              <a:buNone/>
-            </a:pPr>
-            <a:r>
-              <a:rPr/>
+            <a:pPr marL="0" lvl="0" indent="0">
+              <a:buNone/>
+            </a:pPr>
+            <a:r>
               <a:t>Mise en contexte</a:t>
             </a:r>
           </a:p>
@@ -4250,84 +3276,73 @@
           <a:p>
             <a:pPr lvl="0"/>
             <a:r>
-              <a:rPr/>
               <a:t>Un ordinateur est une machine électronique programmable et capable de mémoriser, de retrouver et de traiter des données.​</a:t>
             </a:r>
           </a:p>
           <a:p>
             <a:pPr lvl="0"/>
             <a:r>
-              <a:rPr/>
               <a:t>Depuis que vous êtes petits, vous avez appris à « faire des choses » : ​</a:t>
             </a:r>
           </a:p>
           <a:p>
             <a:pPr lvl="1"/>
             <a:r>
-              <a:rPr/>
               <a:t>lever la main ;</a:t>
             </a:r>
           </a:p>
           <a:p>
             <a:pPr lvl="1"/>
             <a:r>
-              <a:rPr/>
               <a:t>saisir le coin supérieur droit de la page ;</a:t>
             </a:r>
           </a:p>
           <a:p>
             <a:pPr lvl="1"/>
             <a:r>
-              <a:rPr/>
               <a:t>déplacer la main gauche à droite ; ​</a:t>
             </a:r>
           </a:p>
           <a:p>
             <a:pPr lvl="1"/>
             <a:r>
-              <a:rPr/>
               <a:t>ramener la main à sa position initiale.​</a:t>
             </a:r>
           </a:p>
           <a:p>
             <a:pPr lvl="1"/>
             <a:r>
-              <a:rPr/>
               <a:t>etc.​</a:t>
             </a:r>
           </a:p>
           <a:p>
             <a:pPr lvl="0"/>
             <a:r>
-              <a:rPr/>
               <a:t>Malheureusement, l’ordinateur n’est pas intelligent.​</a:t>
             </a:r>
           </a:p>
           <a:p>
             <a:pPr lvl="1"/>
             <a:r>
-              <a:rPr/>
               <a:t>Il n’a donc pas d’aptitudes à raisonner. ​</a:t>
             </a:r>
           </a:p>
           <a:p>
             <a:pPr lvl="1"/>
             <a:r>
-              <a:rPr/>
               <a:t>Il ne peut pas analyser un problème et y apporter une solution. ​</a:t>
             </a:r>
           </a:p>
           <a:p>
-            <a:pPr lvl="0" indent="0" marL="0">
-              <a:buNone/>
-            </a:pPr>
-            <a:r>
-              <a:rPr/>
+            <a:pPr marL="0" lvl="0" indent="0">
+              <a:buNone/>
+            </a:pPr>
+            <a:r>
               <a:t>*** Mais il sait très bien obéir aux instructions et fera exactement tout ce qu’on lui dira de faire… (SANS SE PLAINDRE)​**</a:t>
             </a:r>
           </a:p>
           <a:p>
-            <a:pPr lvl="0" indent="0" marL="0">
+            <a:pPr marL="0" lvl="0" indent="0">
               <a:buNone/>
             </a:pPr>
             <a:r>
@@ -4339,6 +3354,9 @@
       </p:sp>
     </p:spTree>
   </p:cSld>
+  <p:clrMapOvr>
+    <a:masterClrMapping/>
+  </p:clrMapOvr>
 </p:sld>
 </file>
 
@@ -4379,11 +3397,10 @@
           <a:bodyPr/>
           <a:lstStyle/>
           <a:p>
-            <a:pPr lvl="0" indent="0" marL="0">
-              <a:buNone/>
-            </a:pPr>
-            <a:r>
-              <a:rPr/>
+            <a:pPr marL="0" lvl="0" indent="0">
+              <a:buNone/>
+            </a:pPr>
+            <a:r>
               <a:t>Définitions</a:t>
             </a:r>
           </a:p>
@@ -4404,7 +3421,7 @@
           <a:bodyPr/>
           <a:lstStyle/>
           <a:p>
-            <a:pPr lvl="0" indent="0" marL="0">
+            <a:pPr marL="0" lvl="0" indent="0">
               <a:spcBef>
                 <a:spcPts val="3000"/>
               </a:spcBef>
@@ -4416,25 +3433,23 @@
             </a:r>
           </a:p>
           <a:p>
-            <a:pPr lvl="0" indent="0" marL="0">
-              <a:buNone/>
-            </a:pPr>
-            <a:r>
-              <a:rPr/>
+            <a:pPr marL="0" lvl="0" indent="0">
+              <a:buNone/>
+            </a:pPr>
+            <a:r>
               <a:t>Travail consistant à définir une séquence d’instructions qui seront exécutées par un ordinateur.​</a:t>
             </a:r>
           </a:p>
           <a:p>
-            <a:pPr lvl="0" indent="0" marL="0">
-              <a:buNone/>
-            </a:pPr>
-            <a:r>
-              <a:rPr/>
+            <a:pPr marL="0" lvl="0" indent="0">
+              <a:buNone/>
+            </a:pPr>
+            <a:r>
               <a:t>La programmation se divise en deux parties ​: * Résoudre le problème (algorithme)​ : Déterminer le travail que l’ordinateur doit accomplir.​ *Mettre en œuvre la solution retenue (Programmer).</a:t>
             </a:r>
           </a:p>
           <a:p>
-            <a:pPr lvl="0" indent="0" marL="0">
+            <a:pPr marL="0" lvl="0" indent="0">
               <a:spcBef>
                 <a:spcPts val="3000"/>
               </a:spcBef>
@@ -4446,48 +3461,42 @@
             </a:r>
           </a:p>
           <a:p>
-            <a:pPr lvl="0" indent="0" marL="0">
-              <a:buNone/>
-            </a:pPr>
-            <a:r>
-              <a:rPr/>
+            <a:pPr marL="0" lvl="0" indent="0">
+              <a:buNone/>
+            </a:pPr>
+            <a:r>
               <a:t>Séquence d’instructions indiquant les opérations qu’un ordinateur doit effectuer. ​</a:t>
             </a:r>
           </a:p>
           <a:p>
-            <a:pPr lvl="0" indent="0" marL="0">
-              <a:buNone/>
-            </a:pPr>
-            <a:r>
-              <a:rPr/>
+            <a:pPr marL="0" lvl="0" indent="0">
+              <a:buNone/>
+            </a:pPr>
+            <a:r>
               <a:t>Un bon programme :​</a:t>
             </a:r>
           </a:p>
           <a:p>
             <a:pPr lvl="0"/>
             <a:r>
-              <a:rPr/>
               <a:t>doit être fonctionnel (qu’il accomplisse la tâche qu’on lui demande);​</a:t>
             </a:r>
           </a:p>
           <a:p>
             <a:pPr lvl="0"/>
             <a:r>
-              <a:rPr/>
               <a:t>peut être lu et compris;​</a:t>
             </a:r>
           </a:p>
           <a:p>
             <a:pPr lvl="0"/>
             <a:r>
-              <a:rPr/>
               <a:t>peut être modifié, si nécessaire;​</a:t>
             </a:r>
           </a:p>
           <a:p>
             <a:pPr lvl="0"/>
             <a:r>
-              <a:rPr/>
               <a:t>respecte l’échéancier et le budget fixés.</a:t>
             </a:r>
           </a:p>
@@ -4495,6 +3504,9 @@
       </p:sp>
     </p:spTree>
   </p:cSld>
+  <p:clrMapOvr>
+    <a:masterClrMapping/>
+  </p:clrMapOvr>
 </p:sld>
 </file>
 
@@ -4530,7 +3542,7 @@
           <a:bodyPr/>
           <a:lstStyle/>
           <a:p>
-            <a:pPr lvl="0" indent="0" marL="0">
+            <a:pPr marL="0" lvl="0" indent="0">
               <a:spcBef>
                 <a:spcPts val="3000"/>
               </a:spcBef>
@@ -4542,7 +3554,7 @@
             </a:r>
           </a:p>
           <a:p>
-            <a:pPr lvl="0" indent="0" marL="0">
+            <a:pPr marL="0" lvl="0" indent="0">
               <a:spcBef>
                 <a:spcPts val="3000"/>
               </a:spcBef>
@@ -4554,16 +3566,15 @@
             </a:r>
           </a:p>
           <a:p>
-            <a:pPr lvl="0" indent="0" marL="0">
-              <a:buNone/>
-            </a:pPr>
-            <a:r>
-              <a:rPr/>
+            <a:pPr marL="0" lvl="0" indent="0">
+              <a:buNone/>
+            </a:pPr>
+            <a:r>
               <a:t>Comprendre (définir) le problème. Cette étape est primordiale. Comment faire un programme si vous ne comprenez pas ce qu’il doit faire ????​​</a:t>
             </a:r>
           </a:p>
           <a:p>
-            <a:pPr lvl="0" indent="0" marL="0">
+            <a:pPr marL="0" lvl="0" indent="0">
               <a:spcBef>
                 <a:spcPts val="3000"/>
               </a:spcBef>
@@ -4575,16 +3586,15 @@
             </a:r>
           </a:p>
           <a:p>
-            <a:pPr lvl="0" indent="0" marL="0">
-              <a:buNone/>
-            </a:pPr>
-            <a:r>
-              <a:rPr/>
+            <a:pPr marL="0" lvl="0" indent="0">
+              <a:buNone/>
+            </a:pPr>
+            <a:r>
               <a:t>Définir une séquence d’opérations permettant de résoudre le problème dans un langage de tous les jours.​​</a:t>
             </a:r>
           </a:p>
           <a:p>
-            <a:pPr lvl="0" indent="0" marL="0">
+            <a:pPr marL="0" lvl="0" indent="0">
               <a:spcBef>
                 <a:spcPts val="3000"/>
               </a:spcBef>
@@ -4596,11 +3606,10 @@
             </a:r>
           </a:p>
           <a:p>
-            <a:pPr lvl="0" indent="0" marL="0">
-              <a:buNone/>
-            </a:pPr>
-            <a:r>
-              <a:rPr/>
+            <a:pPr marL="0" lvl="0" indent="0">
+              <a:buNone/>
+            </a:pPr>
+            <a:r>
               <a:t>Effectuer ces opérations pour voir si la solution résout effectivement le problème.</a:t>
             </a:r>
           </a:p>
@@ -4608,6 +3617,9 @@
       </p:sp>
     </p:spTree>
   </p:cSld>
+  <p:clrMapOvr>
+    <a:masterClrMapping/>
+  </p:clrMapOvr>
 </p:sld>
 </file>
 
@@ -4643,7 +3655,7 @@
           <a:bodyPr/>
           <a:lstStyle/>
           <a:p>
-            <a:pPr lvl="0" indent="0" marL="0">
+            <a:pPr marL="0" lvl="0" indent="0">
               <a:spcBef>
                 <a:spcPts val="3000"/>
               </a:spcBef>
@@ -4655,7 +3667,7 @@
             </a:r>
           </a:p>
           <a:p>
-            <a:pPr lvl="0" indent="0" marL="0">
+            <a:pPr marL="0" lvl="0" indent="0">
               <a:spcBef>
                 <a:spcPts val="3000"/>
               </a:spcBef>
@@ -4667,16 +3679,15 @@
             </a:r>
           </a:p>
           <a:p>
-            <a:pPr lvl="0" indent="0" marL="0">
-              <a:buNone/>
-            </a:pPr>
-            <a:r>
-              <a:rPr/>
+            <a:pPr marL="0" lvl="0" indent="0">
+              <a:buNone/>
+            </a:pPr>
+            <a:r>
               <a:t>Traduire l’algorithme dans un langage de programmation.​</a:t>
             </a:r>
           </a:p>
           <a:p>
-            <a:pPr lvl="0" indent="0" marL="0">
+            <a:pPr marL="0" lvl="0" indent="0">
               <a:spcBef>
                 <a:spcPts val="3000"/>
               </a:spcBef>
@@ -4688,16 +3699,15 @@
             </a:r>
           </a:p>
           <a:p>
-            <a:pPr lvl="0" indent="0" marL="0">
-              <a:buNone/>
-            </a:pPr>
-            <a:r>
-              <a:rPr/>
+            <a:pPr marL="0" lvl="0" indent="0">
+              <a:buNone/>
+            </a:pPr>
+            <a:r>
               <a:t>Faire exécuter les instructions par l’ordinateur. Vérifier les résultats et corriger le programme jusqu’à ce qu’il fonctionne correctement.​</a:t>
             </a:r>
           </a:p>
           <a:p>
-            <a:pPr lvl="0" indent="0" marL="0">
+            <a:pPr marL="0" lvl="0" indent="0">
               <a:spcBef>
                 <a:spcPts val="3000"/>
               </a:spcBef>
@@ -4709,11 +3719,10 @@
             </a:r>
           </a:p>
           <a:p>
-            <a:pPr lvl="0" indent="0" marL="0">
-              <a:buNone/>
-            </a:pPr>
-            <a:r>
-              <a:rPr/>
+            <a:pPr marL="0" lvl="0" indent="0">
+              <a:buNone/>
+            </a:pPr>
+            <a:r>
               <a:t>Se servir du programme.</a:t>
             </a:r>
           </a:p>
@@ -4721,6 +3730,9 @@
       </p:sp>
     </p:spTree>
   </p:cSld>
+  <p:clrMapOvr>
+    <a:masterClrMapping/>
+  </p:clrMapOvr>
 </p:sld>
 </file>
 
@@ -4756,7 +3768,7 @@
           <a:bodyPr/>
           <a:lstStyle/>
           <a:p>
-            <a:pPr lvl="0" indent="0" marL="0">
+            <a:pPr marL="0" lvl="0" indent="0">
               <a:spcBef>
                 <a:spcPts val="3000"/>
               </a:spcBef>
@@ -4768,29 +3780,26 @@
             </a:r>
           </a:p>
           <a:p>
-            <a:pPr lvl="0" indent="0" marL="0">
-              <a:buNone/>
-            </a:pPr>
-            <a:r>
-              <a:rPr/>
+            <a:pPr marL="0" lvl="0" indent="0">
+              <a:buNone/>
+            </a:pPr>
+            <a:r>
               <a:t>Séquence d’opérations à effectuer pour résoudre un problème en un nombre fini d’étapes.​</a:t>
             </a:r>
           </a:p>
           <a:p>
-            <a:pPr lvl="0" indent="0" marL="0">
-              <a:buNone/>
-            </a:pPr>
-            <a:r>
-              <a:rPr/>
+            <a:pPr marL="0" lvl="0" indent="0">
+              <a:buNone/>
+            </a:pPr>
+            <a:r>
               <a:t>Vous faites des algorithmes tous les jours ! Vous êtes étonnés ? Eh oui! puisqu’un algorithme est simplement une description verbale ou écrite indiquant l’enchaînement des actions nécessaires à l’accomplissement d’une tâche.​</a:t>
             </a:r>
           </a:p>
           <a:p>
-            <a:pPr lvl="0" indent="0" marL="0">
-              <a:buNone/>
-            </a:pPr>
-            <a:r>
-              <a:rPr/>
+            <a:pPr marL="0" lvl="0" indent="0">
+              <a:buNone/>
+            </a:pPr>
+            <a:r>
               <a:t>Exemple: Algorithme pour démarrer une automobile</a:t>
             </a:r>
           </a:p>
@@ -4798,6 +3807,9 @@
       </p:sp>
     </p:spTree>
   </p:cSld>
+  <p:clrMapOvr>
+    <a:masterClrMapping/>
+  </p:clrMapOvr>
 </p:sld>
 </file>
 
@@ -4838,11 +3850,10 @@
           <a:bodyPr/>
           <a:lstStyle/>
           <a:p>
-            <a:pPr lvl="0" indent="0" marL="0">
-              <a:buNone/>
-            </a:pPr>
-            <a:r>
-              <a:rPr/>
+            <a:pPr marL="0" lvl="0" indent="0">
+              <a:buNone/>
+            </a:pPr>
+            <a:r>
               <a:t>Étapes à suivre pour réaliser un algorithme ​</a:t>
             </a:r>
           </a:p>
@@ -4863,74 +3874,66 @@
           <a:bodyPr/>
           <a:lstStyle/>
           <a:p>
-            <a:pPr lvl="0" indent="-257175" marL="257175">
+            <a:pPr marL="257175" lvl="0" indent="-257175">
               <a:buAutoNum type="arabicPeriod"/>
             </a:pPr>
             <a:r>
-              <a:rPr/>
               <a:t>S’assurer de bien comprendre le problème à résoudre ; ​</a:t>
             </a:r>
           </a:p>
           <a:p>
-            <a:pPr lvl="0" indent="-257175" marL="257175">
+            <a:pPr marL="257175" lvl="0" indent="-257175">
               <a:buAutoNum type="arabicPeriod"/>
             </a:pPr>
             <a:r>
-              <a:rPr/>
               <a:t>Réaliser un exemple concret ; ​</a:t>
             </a:r>
           </a:p>
           <a:p>
-            <a:pPr lvl="0" indent="-257175" marL="257175">
+            <a:pPr marL="257175" lvl="0" indent="-257175">
               <a:buAutoNum type="arabicPeriod"/>
             </a:pPr>
             <a:r>
-              <a:rPr/>
               <a:t>Faire une première ébauche d’une solution envisagée ; ​</a:t>
             </a:r>
           </a:p>
           <a:p>
-            <a:pPr lvl="0" indent="-257175" marL="257175">
+            <a:pPr marL="257175" lvl="0" indent="-257175">
               <a:buAutoNum type="arabicPeriod"/>
             </a:pPr>
             <a:r>
-              <a:rPr/>
               <a:t>Identifier de façon claire les variables en entrée, les variables en sortie et les constantes ; ​</a:t>
             </a:r>
           </a:p>
           <a:p>
-            <a:pPr lvl="0" indent="-257175" marL="257175">
+            <a:pPr marL="257175" lvl="0" indent="-257175">
               <a:buAutoNum type="arabicPeriod"/>
             </a:pPr>
             <a:r>
-              <a:rPr/>
               <a:t>Considérer chaque étape et les détailler si cela s’avère nécessaire ; ​</a:t>
             </a:r>
           </a:p>
           <a:p>
-            <a:pPr lvl="0" indent="-257175" marL="257175">
+            <a:pPr marL="257175" lvl="0" indent="-257175">
               <a:buAutoNum type="arabicPeriod"/>
             </a:pPr>
             <a:r>
-              <a:rPr/>
               <a:t>Lorsque l’algorithme est suffisamment clair, faire la trace ; ​</a:t>
             </a:r>
           </a:p>
           <a:p>
-            <a:pPr lvl="0" indent="-257175" marL="257175">
+            <a:pPr marL="257175" lvl="0" indent="-257175">
               <a:buAutoNum type="arabicPeriod"/>
             </a:pPr>
             <a:r>
-              <a:rPr/>
               <a:t>Traduire l’algorithme dans un langage de programmation ; ​</a:t>
             </a:r>
           </a:p>
           <a:p>
-            <a:pPr lvl="0" indent="-257175" marL="257175">
+            <a:pPr marL="257175" lvl="0" indent="-257175">
               <a:buAutoNum type="arabicPeriod"/>
             </a:pPr>
             <a:r>
-              <a:rPr/>
               <a:t>Faire les jeux d’essais.</a:t>
             </a:r>
           </a:p>
@@ -4938,6 +3941,9 @@
       </p:sp>
     </p:spTree>
   </p:cSld>
+  <p:clrMapOvr>
+    <a:masterClrMapping/>
+  </p:clrMapOvr>
 </p:sld>
 </file>
 
@@ -4973,7 +3979,7 @@
           <a:bodyPr/>
           <a:lstStyle/>
           <a:p>
-            <a:pPr lvl="0" indent="0" marL="0">
+            <a:pPr marL="0" lvl="0" indent="0">
               <a:spcBef>
                 <a:spcPts val="3000"/>
               </a:spcBef>
@@ -4985,38 +3991,34 @@
             </a:r>
           </a:p>
           <a:p>
-            <a:pPr lvl="0" indent="0" marL="0">
-              <a:buNone/>
-            </a:pPr>
-            <a:r>
-              <a:rPr/>
+            <a:pPr marL="0" lvl="0" indent="0">
+              <a:buNone/>
+            </a:pPr>
+            <a:r>
               <a:t>Une instruction est une opération élémentaire d’un algorithme. ​ C’est une commande que l’interlocuteur peut comprendre et réaliser.​</a:t>
             </a:r>
           </a:p>
           <a:p>
-            <a:pPr lvl="0" indent="0" marL="0">
-              <a:buNone/>
-            </a:pPr>
-            <a:r>
-              <a:rPr/>
+            <a:pPr marL="0" lvl="0" indent="0">
+              <a:buNone/>
+            </a:pPr>
+            <a:r>
               <a:t>Une instruction précise : ​</a:t>
             </a:r>
           </a:p>
           <a:p>
-            <a:pPr lvl="0" indent="0" marL="0">
-              <a:buNone/>
-            </a:pPr>
-            <a:r>
-              <a:rPr/>
+            <a:pPr marL="0" lvl="0" indent="0">
+              <a:buNone/>
+            </a:pPr>
+            <a:r>
               <a:t>le nom de l’opération à effectuer (lire, écrire, additionner, comparer…)​</a:t>
             </a:r>
           </a:p>
           <a:p>
-            <a:pPr lvl="0" indent="0" marL="0">
-              <a:buNone/>
-            </a:pPr>
-            <a:r>
-              <a:rPr/>
+            <a:pPr marL="0" lvl="0" indent="0">
+              <a:buNone/>
+            </a:pPr>
+            <a:r>
               <a:t>les données qui font l’objet de l’opération.</a:t>
             </a:r>
           </a:p>
@@ -5024,6 +4026,9 @@
       </p:sp>
     </p:spTree>
   </p:cSld>
+  <p:clrMapOvr>
+    <a:masterClrMapping/>
+  </p:clrMapOvr>
 </p:sld>
 </file>
 
@@ -5059,7 +4064,7 @@
           <a:bodyPr/>
           <a:lstStyle/>
           <a:p>
-            <a:pPr lvl="0" indent="0" marL="0">
+            <a:pPr marL="0" lvl="0" indent="0">
               <a:spcBef>
                 <a:spcPts val="3000"/>
               </a:spcBef>
@@ -5073,42 +4078,36 @@
           <a:p>
             <a:pPr lvl="0"/>
             <a:r>
-              <a:rPr/>
               <a:t>Ensemble de règles, de symboles et de mots servant à écrire des programmes.​</a:t>
             </a:r>
           </a:p>
           <a:p>
             <a:pPr lvl="0"/>
             <a:r>
-              <a:rPr/>
               <a:t>Pour rédiger un programme, on n’emploie pas une langue comme le français ou l’anglais. On utilise plutôt un langage de programmation, qui permet d’écrire uniquement des instructions que l’ordinateur peut exécuter. ​</a:t>
             </a:r>
           </a:p>
           <a:p>
             <a:pPr lvl="0"/>
             <a:r>
-              <a:rPr/>
               <a:t>Petit groupe de mots (if then else while)​</a:t>
             </a:r>
           </a:p>
           <a:p>
             <a:pPr lvl="0"/>
             <a:r>
-              <a:rPr/>
               <a:t>Symboles mathématiques +-*/​</a:t>
             </a:r>
           </a:p>
           <a:p>
             <a:pPr lvl="0"/>
             <a:r>
-              <a:rPr/>
               <a:t>Ensemble de règles de grammaire très précises​</a:t>
             </a:r>
           </a:p>
           <a:p>
             <a:pPr lvl="0"/>
             <a:r>
-              <a:rPr/>
               <a:t>Écrire un programme consiste à traduire un algorithme dans un langage de programmation.</a:t>
             </a:r>
           </a:p>
@@ -5116,6 +4115,9 @@
       </p:sp>
     </p:spTree>
   </p:cSld>
+  <p:clrMapOvr>
+    <a:masterClrMapping/>
+  </p:clrMapOvr>
 </p:sld>
 </file>
 
@@ -5378,265 +4380,4 @@
     </a:ext>
   </a:extLst>
 </a:theme>
-</file>
-
-<file path=ppt/theme/theme2.xml><?xml version="1.0" encoding="utf-8"?>
-<a:theme xmlns:a="http://schemas.openxmlformats.org/drawingml/2006/main" name="Office Theme">
-  <a:themeElements>
-    <a:clrScheme name="Office">
-      <a:dk1>
-        <a:sysClr val="windowText" lastClr="000000"/>
-      </a:dk1>
-      <a:lt1>
-        <a:sysClr val="window" lastClr="FFFFFF"/>
-      </a:lt1>
-      <a:dk2>
-        <a:srgbClr val="44546A"/>
-      </a:dk2>
-      <a:lt2>
-        <a:srgbClr val="E7E6E6"/>
-      </a:lt2>
-      <a:accent1>
-        <a:srgbClr val="5B9BD5"/>
-      </a:accent1>
-      <a:accent2>
-        <a:srgbClr val="ED7D31"/>
-      </a:accent2>
-      <a:accent3>
-        <a:srgbClr val="A5A5A5"/>
-      </a:accent3>
-      <a:accent4>
-        <a:srgbClr val="FFC000"/>
-      </a:accent4>
-      <a:accent5>
-        <a:srgbClr val="4472C4"/>
-      </a:accent5>
-      <a:accent6>
-        <a:srgbClr val="70AD47"/>
-      </a:accent6>
-      <a:hlink>
-        <a:srgbClr val="0563C1"/>
-      </a:hlink>
-      <a:folHlink>
-        <a:srgbClr val="954F72"/>
-      </a:folHlink>
-    </a:clrScheme>
-    <a:fontScheme name="Office">
-      <a:majorFont>
-        <a:latin typeface="Calibri Light" panose="020F0302020204030204"/>
-        <a:ea typeface=""/>
-        <a:cs typeface=""/>
-        <a:font script="Jpan" typeface="ＭＳ Ｐゴシック"/>
-        <a:font script="Hang" typeface="맑은 고딕"/>
-        <a:font script="Hans" typeface="宋体"/>
-        <a:font script="Hant" typeface="新細明體"/>
-        <a:font script="Arab" typeface="Times New Roman"/>
-        <a:font script="Hebr" typeface="Times New Roman"/>
-        <a:font script="Thai" typeface="Angsana New"/>
-        <a:font script="Ethi" typeface="Nyala"/>
-        <a:font script="Beng" typeface="Vrinda"/>
-        <a:font script="Gujr" typeface="Shruti"/>
-        <a:font script="Khmr" typeface="MoolBoran"/>
-        <a:font script="Knda" typeface="Tunga"/>
-        <a:font script="Guru" typeface="Raavi"/>
-        <a:font script="Cans" typeface="Euphemia"/>
-        <a:font script="Cher" typeface="Plantagenet Cherokee"/>
-        <a:font script="Yiii" typeface="Microsoft Yi Baiti"/>
-        <a:font script="Tibt" typeface="Microsoft Himalaya"/>
-        <a:font script="Thaa" typeface="MV Boli"/>
-        <a:font script="Deva" typeface="Mangal"/>
-        <a:font script="Telu" typeface="Gautami"/>
-        <a:font script="Taml" typeface="Latha"/>
-        <a:font script="Syrc" typeface="Estrangelo Edessa"/>
-        <a:font script="Orya" typeface="Kalinga"/>
-        <a:font script="Mlym" typeface="Kartika"/>
-        <a:font script="Laoo" typeface="DokChampa"/>
-        <a:font script="Sinh" typeface="Iskoola Pota"/>
-        <a:font script="Mong" typeface="Mongolian Baiti"/>
-        <a:font script="Viet" typeface="Times New Roman"/>
-        <a:font script="Uigh" typeface="Microsoft Uighur"/>
-        <a:font script="Geor" typeface="Sylfaen"/>
-      </a:majorFont>
-      <a:minorFont>
-        <a:latin typeface="Calibri" panose="020F0502020204030204"/>
-        <a:ea typeface=""/>
-        <a:cs typeface=""/>
-        <a:font script="Jpan" typeface="ＭＳ Ｐゴシック"/>
-        <a:font script="Hang" typeface="맑은 고딕"/>
-        <a:font script="Hans" typeface="宋体"/>
-        <a:font script="Hant" typeface="新細明體"/>
-        <a:font script="Arab" typeface="Arial"/>
-        <a:font script="Hebr" typeface="Arial"/>
-        <a:font script="Thai" typeface="Cordia New"/>
-        <a:font script="Ethi" typeface="Nyala"/>
-        <a:font script="Beng" typeface="Vrinda"/>
-        <a:font script="Gujr" typeface="Shruti"/>
-        <a:font script="Khmr" typeface="DaunPenh"/>
-        <a:font script="Knda" typeface="Tunga"/>
-        <a:font script="Guru" typeface="Raavi"/>
-        <a:font script="Cans" typeface="Euphemia"/>
-        <a:font script="Cher" typeface="Plantagenet Cherokee"/>
-        <a:font script="Yiii" typeface="Microsoft Yi Baiti"/>
-        <a:font script="Tibt" typeface="Microsoft Himalaya"/>
-        <a:font script="Thaa" typeface="MV Boli"/>
-        <a:font script="Deva" typeface="Mangal"/>
-        <a:font script="Telu" typeface="Gautami"/>
-        <a:font script="Taml" typeface="Latha"/>
-        <a:font script="Syrc" typeface="Estrangelo Edessa"/>
-        <a:font script="Orya" typeface="Kalinga"/>
-        <a:font script="Mlym" typeface="Kartika"/>
-        <a:font script="Laoo" typeface="DokChampa"/>
-        <a:font script="Sinh" typeface="Iskoola Pota"/>
-        <a:font script="Mong" typeface="Mongolian Baiti"/>
-        <a:font script="Viet" typeface="Arial"/>
-        <a:font script="Uigh" typeface="Microsoft Uighur"/>
-        <a:font script="Geor" typeface="Sylfaen"/>
-      </a:minorFont>
-    </a:fontScheme>
-    <a:fmtScheme name="Office">
-      <a:fillStyleLst>
-        <a:solidFill>
-          <a:schemeClr val="phClr"/>
-        </a:solidFill>
-        <a:gradFill rotWithShape="1">
-          <a:gsLst>
-            <a:gs pos="0">
-              <a:schemeClr val="phClr">
-                <a:lumMod val="110000"/>
-                <a:satMod val="105000"/>
-                <a:tint val="67000"/>
-              </a:schemeClr>
-            </a:gs>
-            <a:gs pos="50000">
-              <a:schemeClr val="phClr">
-                <a:lumMod val="105000"/>
-                <a:satMod val="103000"/>
-                <a:tint val="73000"/>
-              </a:schemeClr>
-            </a:gs>
-            <a:gs pos="100000">
-              <a:schemeClr val="phClr">
-                <a:lumMod val="105000"/>
-                <a:satMod val="109000"/>
-                <a:tint val="81000"/>
-              </a:schemeClr>
-            </a:gs>
-          </a:gsLst>
-          <a:lin ang="5400000" scaled="0"/>
-        </a:gradFill>
-        <a:gradFill rotWithShape="1">
-          <a:gsLst>
-            <a:gs pos="0">
-              <a:schemeClr val="phClr">
-                <a:satMod val="103000"/>
-                <a:lumMod val="102000"/>
-                <a:tint val="94000"/>
-              </a:schemeClr>
-            </a:gs>
-            <a:gs pos="50000">
-              <a:schemeClr val="phClr">
-                <a:satMod val="110000"/>
-                <a:lumMod val="100000"/>
-                <a:shade val="100000"/>
-              </a:schemeClr>
-            </a:gs>
-            <a:gs pos="100000">
-              <a:schemeClr val="phClr">
-                <a:lumMod val="99000"/>
-                <a:satMod val="120000"/>
-                <a:shade val="78000"/>
-              </a:schemeClr>
-            </a:gs>
-          </a:gsLst>
-          <a:lin ang="5400000" scaled="0"/>
-        </a:gradFill>
-      </a:fillStyleLst>
-      <a:lnStyleLst>
-        <a:ln w="6350" cap="flat" cmpd="sng" algn="ctr">
-          <a:solidFill>
-            <a:schemeClr val="phClr"/>
-          </a:solidFill>
-          <a:prstDash val="solid"/>
-          <a:miter lim="800000"/>
-        </a:ln>
-        <a:ln w="12700" cap="flat" cmpd="sng" algn="ctr">
-          <a:solidFill>
-            <a:schemeClr val="phClr"/>
-          </a:solidFill>
-          <a:prstDash val="solid"/>
-          <a:miter lim="800000"/>
-        </a:ln>
-        <a:ln w="19050" cap="flat" cmpd="sng" algn="ctr">
-          <a:solidFill>
-            <a:schemeClr val="phClr"/>
-          </a:solidFill>
-          <a:prstDash val="solid"/>
-          <a:miter lim="800000"/>
-        </a:ln>
-      </a:lnStyleLst>
-      <a:effectStyleLst>
-        <a:effectStyle>
-          <a:effectLst/>
-        </a:effectStyle>
-        <a:effectStyle>
-          <a:effectLst/>
-        </a:effectStyle>
-        <a:effectStyle>
-          <a:effectLst>
-            <a:outerShdw blurRad="57150" dist="19050" dir="5400000" algn="ctr" rotWithShape="0">
-              <a:srgbClr val="000000">
-                <a:alpha val="63000"/>
-              </a:srgbClr>
-            </a:outerShdw>
-          </a:effectLst>
-        </a:effectStyle>
-      </a:effectStyleLst>
-      <a:bgFillStyleLst>
-        <a:solidFill>
-          <a:schemeClr val="phClr"/>
-        </a:solidFill>
-        <a:solidFill>
-          <a:schemeClr val="phClr">
-            <a:tint val="95000"/>
-            <a:satMod val="170000"/>
-          </a:schemeClr>
-        </a:solidFill>
-        <a:gradFill rotWithShape="1">
-          <a:gsLst>
-            <a:gs pos="0">
-              <a:schemeClr val="phClr">
-                <a:tint val="93000"/>
-                <a:satMod val="150000"/>
-                <a:shade val="98000"/>
-                <a:lumMod val="102000"/>
-              </a:schemeClr>
-            </a:gs>
-            <a:gs pos="50000">
-              <a:schemeClr val="phClr">
-                <a:tint val="98000"/>
-                <a:satMod val="130000"/>
-                <a:shade val="90000"/>
-                <a:lumMod val="103000"/>
-              </a:schemeClr>
-            </a:gs>
-            <a:gs pos="100000">
-              <a:schemeClr val="phClr">
-                <a:shade val="63000"/>
-                <a:satMod val="120000"/>
-              </a:schemeClr>
-            </a:gs>
-          </a:gsLst>
-          <a:lin ang="5400000" scaled="0"/>
-        </a:gradFill>
-      </a:bgFillStyleLst>
-    </a:fmtScheme>
-  </a:themeElements>
-  <a:objectDefaults/>
-  <a:extraClrSchemeLst/>
-  <a:extLst>
-    <a:ext uri="{05A4C25C-085E-4340-85A3-A5531E510DB2}">
-      <thm15:themeFamily xmlns:thm15="http://schemas.microsoft.com/office/thememl/2012/main" name="Office Theme" id="{62F939B6-93AF-4DB8-9C6B-D6C7DFDC589F}" vid="{4A3C46E8-61CC-4603-A589-7422A47A8E4A}"/>
-    </a:ext>
-  </a:extLst>
-</a:theme>
 </file>
</xml_diff>